<commit_message>
Adding lec 17 slides - correction
</commit_message>
<xml_diff>
--- a/tyler/meena/cs220/f20/materials/lec_17_F20.pptx
+++ b/tyler/meena/cs220/f20/materials/lec_17_F20.pptx
@@ -2166,7 +2166,7 @@
           </a:ln>
           <a:extLst>
             <a:ext uri="{C572A759-6A51-4108-AA02-DFA0A04FC94B}">
-              <ma14:wrappingTextBoxFlag xmlns:ma14="http://schemas.microsoft.com/office/mac/drawingml/2011/main" xmlns:a14="http://schemas.microsoft.com/office/drawing/2010/main" xmlns:m="http://schemas.openxmlformats.org/officeDocument/2006/math" xmlns="" val="1"/>
+              <ma14:wrappingTextBoxFlag xmlns="" xmlns:m="http://schemas.openxmlformats.org/officeDocument/2006/math" xmlns:a14="http://schemas.microsoft.com/office/drawing/2010/main" xmlns:ma14="http://schemas.microsoft.com/office/mac/drawingml/2011/main" val="1"/>
             </a:ext>
           </a:extLst>
         </p:spPr>
@@ -2205,7 +2205,7 @@
           </a:ln>
           <a:extLst>
             <a:ext uri="{C572A759-6A51-4108-AA02-DFA0A04FC94B}">
-              <ma14:wrappingTextBoxFlag xmlns:ma14="http://schemas.microsoft.com/office/mac/drawingml/2011/main" xmlns:a14="http://schemas.microsoft.com/office/drawing/2010/main" xmlns:m="http://schemas.openxmlformats.org/officeDocument/2006/math" xmlns="" val="1"/>
+              <ma14:wrappingTextBoxFlag xmlns="" xmlns:m="http://schemas.openxmlformats.org/officeDocument/2006/math" xmlns:a14="http://schemas.microsoft.com/office/drawing/2010/main" xmlns:ma14="http://schemas.microsoft.com/office/mac/drawingml/2011/main" val="1"/>
             </a:ext>
           </a:extLst>
         </p:spPr>
@@ -3735,7 +3735,7 @@
           </a:ln>
           <a:extLst>
             <a:ext uri="{C572A759-6A51-4108-AA02-DFA0A04FC94B}">
-              <ma14:wrappingTextBoxFlag xmlns:ma14="http://schemas.microsoft.com/office/mac/drawingml/2011/main" xmlns:a14="http://schemas.microsoft.com/office/drawing/2010/main" xmlns:m="http://schemas.openxmlformats.org/officeDocument/2006/math" xmlns="" val="1"/>
+              <ma14:wrappingTextBoxFlag xmlns="" xmlns:m="http://schemas.openxmlformats.org/officeDocument/2006/math" xmlns:a14="http://schemas.microsoft.com/office/drawing/2010/main" xmlns:ma14="http://schemas.microsoft.com/office/mac/drawingml/2011/main" val="1"/>
             </a:ext>
           </a:extLst>
         </p:spPr>
@@ -3933,7 +3933,7 @@
           </a:ln>
           <a:extLst>
             <a:ext uri="{C572A759-6A51-4108-AA02-DFA0A04FC94B}">
-              <ma14:wrappingTextBoxFlag xmlns:ma14="http://schemas.microsoft.com/office/mac/drawingml/2011/main" xmlns:a14="http://schemas.microsoft.com/office/drawing/2010/main" xmlns:m="http://schemas.openxmlformats.org/officeDocument/2006/math" xmlns="" val="1"/>
+              <ma14:wrappingTextBoxFlag xmlns="" xmlns:m="http://schemas.openxmlformats.org/officeDocument/2006/math" xmlns:a14="http://schemas.microsoft.com/office/drawing/2010/main" xmlns:ma14="http://schemas.microsoft.com/office/mac/drawingml/2011/main" val="1"/>
             </a:ext>
           </a:extLst>
         </p:spPr>
@@ -3980,7 +3980,7 @@
           </a:ln>
           <a:extLst>
             <a:ext uri="{C572A759-6A51-4108-AA02-DFA0A04FC94B}">
-              <ma14:wrappingTextBoxFlag xmlns:ma14="http://schemas.microsoft.com/office/mac/drawingml/2011/main" xmlns:a14="http://schemas.microsoft.com/office/drawing/2010/main" xmlns:m="http://schemas.openxmlformats.org/officeDocument/2006/math" xmlns="" val="1"/>
+              <ma14:wrappingTextBoxFlag xmlns="" xmlns:m="http://schemas.openxmlformats.org/officeDocument/2006/math" xmlns:a14="http://schemas.microsoft.com/office/drawing/2010/main" xmlns:ma14="http://schemas.microsoft.com/office/mac/drawingml/2011/main" val="1"/>
             </a:ext>
           </a:extLst>
         </p:spPr>
@@ -4027,7 +4027,7 @@
           </a:ln>
           <a:extLst>
             <a:ext uri="{C572A759-6A51-4108-AA02-DFA0A04FC94B}">
-              <ma14:wrappingTextBoxFlag xmlns:ma14="http://schemas.microsoft.com/office/mac/drawingml/2011/main" xmlns:a14="http://schemas.microsoft.com/office/drawing/2010/main" xmlns:m="http://schemas.openxmlformats.org/officeDocument/2006/math" xmlns="" val="1"/>
+              <ma14:wrappingTextBoxFlag xmlns="" xmlns:m="http://schemas.openxmlformats.org/officeDocument/2006/math" xmlns:a14="http://schemas.microsoft.com/office/drawing/2010/main" xmlns:ma14="http://schemas.microsoft.com/office/mac/drawingml/2011/main" val="1"/>
             </a:ext>
           </a:extLst>
         </p:spPr>
@@ -4074,7 +4074,7 @@
           </a:ln>
           <a:extLst>
             <a:ext uri="{C572A759-6A51-4108-AA02-DFA0A04FC94B}">
-              <ma14:wrappingTextBoxFlag xmlns:ma14="http://schemas.microsoft.com/office/mac/drawingml/2011/main" xmlns:a14="http://schemas.microsoft.com/office/drawing/2010/main" xmlns:m="http://schemas.openxmlformats.org/officeDocument/2006/math" xmlns="" val="1"/>
+              <ma14:wrappingTextBoxFlag xmlns="" xmlns:m="http://schemas.openxmlformats.org/officeDocument/2006/math" xmlns:a14="http://schemas.microsoft.com/office/drawing/2010/main" xmlns:ma14="http://schemas.microsoft.com/office/mac/drawingml/2011/main" val="1"/>
             </a:ext>
           </a:extLst>
         </p:spPr>
@@ -4184,7 +4184,7 @@
           </a:ln>
           <a:extLst>
             <a:ext uri="{C572A759-6A51-4108-AA02-DFA0A04FC94B}">
-              <ma14:wrappingTextBoxFlag xmlns:ma14="http://schemas.microsoft.com/office/mac/drawingml/2011/main" xmlns:a14="http://schemas.microsoft.com/office/drawing/2010/main" xmlns:m="http://schemas.openxmlformats.org/officeDocument/2006/math" xmlns="" val="1"/>
+              <ma14:wrappingTextBoxFlag xmlns="" xmlns:m="http://schemas.openxmlformats.org/officeDocument/2006/math" xmlns:a14="http://schemas.microsoft.com/office/drawing/2010/main" xmlns:ma14="http://schemas.microsoft.com/office/mac/drawingml/2011/main" val="1"/>
             </a:ext>
           </a:extLst>
         </p:spPr>
@@ -4472,7 +4472,7 @@
           </a:ln>
           <a:extLst>
             <a:ext uri="{C572A759-6A51-4108-AA02-DFA0A04FC94B}">
-              <ma14:wrappingTextBoxFlag xmlns:ma14="http://schemas.microsoft.com/office/mac/drawingml/2011/main" xmlns:a14="http://schemas.microsoft.com/office/drawing/2010/main" xmlns:m="http://schemas.openxmlformats.org/officeDocument/2006/math" xmlns="" val="1"/>
+              <ma14:wrappingTextBoxFlag xmlns="" xmlns:m="http://schemas.openxmlformats.org/officeDocument/2006/math" xmlns:a14="http://schemas.microsoft.com/office/drawing/2010/main" xmlns:ma14="http://schemas.microsoft.com/office/mac/drawingml/2011/main" val="1"/>
             </a:ext>
           </a:extLst>
         </p:spPr>
@@ -4807,7 +4807,7 @@
           </a:ln>
           <a:extLst>
             <a:ext uri="{C572A759-6A51-4108-AA02-DFA0A04FC94B}">
-              <ma14:wrappingTextBoxFlag xmlns:ma14="http://schemas.microsoft.com/office/mac/drawingml/2011/main" xmlns:a14="http://schemas.microsoft.com/office/drawing/2010/main" xmlns:m="http://schemas.openxmlformats.org/officeDocument/2006/math" xmlns="" val="1"/>
+              <ma14:wrappingTextBoxFlag xmlns="" xmlns:m="http://schemas.openxmlformats.org/officeDocument/2006/math" xmlns:a14="http://schemas.microsoft.com/office/drawing/2010/main" xmlns:ma14="http://schemas.microsoft.com/office/mac/drawingml/2011/main" val="1"/>
             </a:ext>
           </a:extLst>
         </p:spPr>
@@ -4880,7 +4880,7 @@
           </a:ln>
           <a:extLst>
             <a:ext uri="{C572A759-6A51-4108-AA02-DFA0A04FC94B}">
-              <ma14:wrappingTextBoxFlag xmlns:ma14="http://schemas.microsoft.com/office/mac/drawingml/2011/main" xmlns:a14="http://schemas.microsoft.com/office/drawing/2010/main" xmlns:m="http://schemas.openxmlformats.org/officeDocument/2006/math" xmlns="" val="1"/>
+              <ma14:wrappingTextBoxFlag xmlns="" xmlns:m="http://schemas.openxmlformats.org/officeDocument/2006/math" xmlns:a14="http://schemas.microsoft.com/office/drawing/2010/main" xmlns:ma14="http://schemas.microsoft.com/office/mac/drawingml/2011/main" val="1"/>
             </a:ext>
           </a:extLst>
         </p:spPr>
@@ -4946,7 +4946,7 @@
           </a:ln>
           <a:extLst>
             <a:ext uri="{C572A759-6A51-4108-AA02-DFA0A04FC94B}">
-              <ma14:wrappingTextBoxFlag xmlns:ma14="http://schemas.microsoft.com/office/mac/drawingml/2011/main" xmlns:a14="http://schemas.microsoft.com/office/drawing/2010/main" xmlns:m="http://schemas.openxmlformats.org/officeDocument/2006/math" xmlns="" val="1"/>
+              <ma14:wrappingTextBoxFlag xmlns="" xmlns:m="http://schemas.openxmlformats.org/officeDocument/2006/math" xmlns:a14="http://schemas.microsoft.com/office/drawing/2010/main" xmlns:ma14="http://schemas.microsoft.com/office/mac/drawingml/2011/main" val="1"/>
             </a:ext>
           </a:extLst>
         </p:spPr>
@@ -5219,7 +5219,7 @@
           </a:ln>
           <a:extLst>
             <a:ext uri="{C572A759-6A51-4108-AA02-DFA0A04FC94B}">
-              <ma14:wrappingTextBoxFlag xmlns:ma14="http://schemas.microsoft.com/office/mac/drawingml/2011/main" xmlns:a14="http://schemas.microsoft.com/office/drawing/2010/main" xmlns:m="http://schemas.openxmlformats.org/officeDocument/2006/math" xmlns="" val="1"/>
+              <ma14:wrappingTextBoxFlag xmlns="" xmlns:m="http://schemas.openxmlformats.org/officeDocument/2006/math" xmlns:a14="http://schemas.microsoft.com/office/drawing/2010/main" xmlns:ma14="http://schemas.microsoft.com/office/mac/drawingml/2011/main" val="1"/>
             </a:ext>
           </a:extLst>
         </p:spPr>
@@ -5387,7 +5387,7 @@
           </a:ln>
           <a:extLst>
             <a:ext uri="{C572A759-6A51-4108-AA02-DFA0A04FC94B}">
-              <ma14:wrappingTextBoxFlag xmlns:ma14="http://schemas.microsoft.com/office/mac/drawingml/2011/main" xmlns:a14="http://schemas.microsoft.com/office/drawing/2010/main" xmlns:m="http://schemas.openxmlformats.org/officeDocument/2006/math" xmlns="" val="1"/>
+              <ma14:wrappingTextBoxFlag xmlns="" xmlns:m="http://schemas.openxmlformats.org/officeDocument/2006/math" xmlns:a14="http://schemas.microsoft.com/office/drawing/2010/main" xmlns:ma14="http://schemas.microsoft.com/office/mac/drawingml/2011/main" val="1"/>
             </a:ext>
           </a:extLst>
         </p:spPr>
@@ -5434,7 +5434,7 @@
           </a:ln>
           <a:extLst>
             <a:ext uri="{C572A759-6A51-4108-AA02-DFA0A04FC94B}">
-              <ma14:wrappingTextBoxFlag xmlns:ma14="http://schemas.microsoft.com/office/mac/drawingml/2011/main" xmlns:a14="http://schemas.microsoft.com/office/drawing/2010/main" xmlns:m="http://schemas.openxmlformats.org/officeDocument/2006/math" xmlns="" val="1"/>
+              <ma14:wrappingTextBoxFlag xmlns="" xmlns:m="http://schemas.openxmlformats.org/officeDocument/2006/math" xmlns:a14="http://schemas.microsoft.com/office/drawing/2010/main" xmlns:ma14="http://schemas.microsoft.com/office/mac/drawingml/2011/main" val="1"/>
             </a:ext>
           </a:extLst>
         </p:spPr>
@@ -5602,7 +5602,7 @@
           </a:ln>
           <a:extLst>
             <a:ext uri="{C572A759-6A51-4108-AA02-DFA0A04FC94B}">
-              <ma14:wrappingTextBoxFlag xmlns:ma14="http://schemas.microsoft.com/office/mac/drawingml/2011/main" xmlns:a14="http://schemas.microsoft.com/office/drawing/2010/main" xmlns:m="http://schemas.openxmlformats.org/officeDocument/2006/math" xmlns="" val="1"/>
+              <ma14:wrappingTextBoxFlag xmlns="" xmlns:m="http://schemas.openxmlformats.org/officeDocument/2006/math" xmlns:a14="http://schemas.microsoft.com/office/drawing/2010/main" xmlns:ma14="http://schemas.microsoft.com/office/mac/drawingml/2011/main" val="1"/>
             </a:ext>
           </a:extLst>
         </p:spPr>
@@ -5760,7 +5760,7 @@
           </a:ln>
           <a:extLst>
             <a:ext uri="{C572A759-6A51-4108-AA02-DFA0A04FC94B}">
-              <ma14:wrappingTextBoxFlag xmlns:ma14="http://schemas.microsoft.com/office/mac/drawingml/2011/main" xmlns:a14="http://schemas.microsoft.com/office/drawing/2010/main" xmlns:m="http://schemas.openxmlformats.org/officeDocument/2006/math" xmlns="" val="1"/>
+              <ma14:wrappingTextBoxFlag xmlns="" xmlns:m="http://schemas.openxmlformats.org/officeDocument/2006/math" xmlns:a14="http://schemas.microsoft.com/office/drawing/2010/main" xmlns:ma14="http://schemas.microsoft.com/office/mac/drawingml/2011/main" val="1"/>
             </a:ext>
           </a:extLst>
         </p:spPr>
@@ -5972,7 +5972,7 @@
           </a:ln>
           <a:extLst>
             <a:ext uri="{C572A759-6A51-4108-AA02-DFA0A04FC94B}">
-              <ma14:wrappingTextBoxFlag xmlns:ma14="http://schemas.microsoft.com/office/mac/drawingml/2011/main" xmlns:a14="http://schemas.microsoft.com/office/drawing/2010/main" xmlns:m="http://schemas.openxmlformats.org/officeDocument/2006/math" xmlns="" val="1"/>
+              <ma14:wrappingTextBoxFlag xmlns="" xmlns:m="http://schemas.openxmlformats.org/officeDocument/2006/math" xmlns:a14="http://schemas.microsoft.com/office/drawing/2010/main" xmlns:ma14="http://schemas.microsoft.com/office/mac/drawingml/2011/main" val="1"/>
             </a:ext>
           </a:extLst>
         </p:spPr>
@@ -6189,7 +6189,7 @@
           </a:ln>
           <a:extLst>
             <a:ext uri="{C572A759-6A51-4108-AA02-DFA0A04FC94B}">
-              <ma14:wrappingTextBoxFlag xmlns:ma14="http://schemas.microsoft.com/office/mac/drawingml/2011/main" xmlns:a14="http://schemas.microsoft.com/office/drawing/2010/main" xmlns:m="http://schemas.openxmlformats.org/officeDocument/2006/math" xmlns="" val="1"/>
+              <ma14:wrappingTextBoxFlag xmlns="" xmlns:m="http://schemas.openxmlformats.org/officeDocument/2006/math" xmlns:a14="http://schemas.microsoft.com/office/drawing/2010/main" xmlns:ma14="http://schemas.microsoft.com/office/mac/drawingml/2011/main" val="1"/>
             </a:ext>
           </a:extLst>
         </p:spPr>
@@ -6435,7 +6435,7 @@
           </a:ln>
           <a:extLst>
             <a:ext uri="{C572A759-6A51-4108-AA02-DFA0A04FC94B}">
-              <ma14:wrappingTextBoxFlag xmlns:ma14="http://schemas.microsoft.com/office/mac/drawingml/2011/main" xmlns:a14="http://schemas.microsoft.com/office/drawing/2010/main" xmlns:m="http://schemas.openxmlformats.org/officeDocument/2006/math" xmlns="" val="1"/>
+              <ma14:wrappingTextBoxFlag xmlns="" xmlns:m="http://schemas.openxmlformats.org/officeDocument/2006/math" xmlns:a14="http://schemas.microsoft.com/office/drawing/2010/main" xmlns:ma14="http://schemas.microsoft.com/office/mac/drawingml/2011/main" val="1"/>
             </a:ext>
           </a:extLst>
         </p:spPr>
@@ -6651,7 +6651,7 @@
           </a:ln>
           <a:extLst>
             <a:ext uri="{C572A759-6A51-4108-AA02-DFA0A04FC94B}">
-              <ma14:wrappingTextBoxFlag xmlns:ma14="http://schemas.microsoft.com/office/mac/drawingml/2011/main" xmlns:a14="http://schemas.microsoft.com/office/drawing/2010/main" xmlns:m="http://schemas.openxmlformats.org/officeDocument/2006/math" xmlns="" val="1"/>
+              <ma14:wrappingTextBoxFlag xmlns="" xmlns:m="http://schemas.openxmlformats.org/officeDocument/2006/math" xmlns:a14="http://schemas.microsoft.com/office/drawing/2010/main" xmlns:ma14="http://schemas.microsoft.com/office/mac/drawingml/2011/main" val="1"/>
             </a:ext>
           </a:extLst>
         </p:spPr>
@@ -7037,7 +7037,7 @@
           </a:ln>
           <a:extLst>
             <a:ext uri="{C572A759-6A51-4108-AA02-DFA0A04FC94B}">
-              <ma14:wrappingTextBoxFlag xmlns:ma14="http://schemas.microsoft.com/office/mac/drawingml/2011/main" xmlns:a14="http://schemas.microsoft.com/office/drawing/2010/main" xmlns:m="http://schemas.openxmlformats.org/officeDocument/2006/math" xmlns="" val="1"/>
+              <ma14:wrappingTextBoxFlag xmlns="" xmlns:m="http://schemas.openxmlformats.org/officeDocument/2006/math" xmlns:a14="http://schemas.microsoft.com/office/drawing/2010/main" xmlns:ma14="http://schemas.microsoft.com/office/mac/drawingml/2011/main" val="1"/>
             </a:ext>
           </a:extLst>
         </p:spPr>
@@ -7094,7 +7094,7 @@
           </a:ln>
           <a:extLst>
             <a:ext uri="{C572A759-6A51-4108-AA02-DFA0A04FC94B}">
-              <ma14:wrappingTextBoxFlag xmlns:ma14="http://schemas.microsoft.com/office/mac/drawingml/2011/main" xmlns:a14="http://schemas.microsoft.com/office/drawing/2010/main" xmlns:m="http://schemas.openxmlformats.org/officeDocument/2006/math" xmlns="" val="1"/>
+              <ma14:wrappingTextBoxFlag xmlns="" xmlns:m="http://schemas.openxmlformats.org/officeDocument/2006/math" xmlns:a14="http://schemas.microsoft.com/office/drawing/2010/main" xmlns:ma14="http://schemas.microsoft.com/office/mac/drawingml/2011/main" val="1"/>
             </a:ext>
           </a:extLst>
         </p:spPr>
@@ -7397,7 +7397,7 @@
           </a:ln>
           <a:extLst>
             <a:ext uri="{C572A759-6A51-4108-AA02-DFA0A04FC94B}">
-              <ma14:wrappingTextBoxFlag xmlns:ma14="http://schemas.microsoft.com/office/mac/drawingml/2011/main" xmlns:a14="http://schemas.microsoft.com/office/drawing/2010/main" xmlns:m="http://schemas.openxmlformats.org/officeDocument/2006/math" xmlns="" val="1"/>
+              <ma14:wrappingTextBoxFlag xmlns="" xmlns:m="http://schemas.openxmlformats.org/officeDocument/2006/math" xmlns:a14="http://schemas.microsoft.com/office/drawing/2010/main" xmlns:ma14="http://schemas.microsoft.com/office/mac/drawingml/2011/main" val="1"/>
             </a:ext>
           </a:extLst>
         </p:spPr>
@@ -7584,7 +7584,7 @@
           </a:ln>
           <a:extLst>
             <a:ext uri="{C572A759-6A51-4108-AA02-DFA0A04FC94B}">
-              <ma14:wrappingTextBoxFlag xmlns:ma14="http://schemas.microsoft.com/office/mac/drawingml/2011/main" xmlns:a14="http://schemas.microsoft.com/office/drawing/2010/main" xmlns:m="http://schemas.openxmlformats.org/officeDocument/2006/math" xmlns="" val="1"/>
+              <ma14:wrappingTextBoxFlag xmlns="" xmlns:m="http://schemas.openxmlformats.org/officeDocument/2006/math" xmlns:a14="http://schemas.microsoft.com/office/drawing/2010/main" xmlns:ma14="http://schemas.microsoft.com/office/mac/drawingml/2011/main" val="1"/>
             </a:ext>
           </a:extLst>
         </p:spPr>
@@ -7798,7 +7798,7 @@
           </a:ln>
           <a:extLst>
             <a:ext uri="{C572A759-6A51-4108-AA02-DFA0A04FC94B}">
-              <ma14:wrappingTextBoxFlag xmlns:ma14="http://schemas.microsoft.com/office/mac/drawingml/2011/main" xmlns:a14="http://schemas.microsoft.com/office/drawing/2010/main" xmlns:m="http://schemas.openxmlformats.org/officeDocument/2006/math" xmlns="" val="1"/>
+              <ma14:wrappingTextBoxFlag xmlns="" xmlns:m="http://schemas.openxmlformats.org/officeDocument/2006/math" xmlns:a14="http://schemas.microsoft.com/office/drawing/2010/main" xmlns:ma14="http://schemas.microsoft.com/office/mac/drawingml/2011/main" val="1"/>
             </a:ext>
           </a:extLst>
         </p:spPr>
@@ -7845,7 +7845,7 @@
           </a:ln>
           <a:extLst>
             <a:ext uri="{C572A759-6A51-4108-AA02-DFA0A04FC94B}">
-              <ma14:wrappingTextBoxFlag xmlns:ma14="http://schemas.microsoft.com/office/mac/drawingml/2011/main" xmlns:a14="http://schemas.microsoft.com/office/drawing/2010/main" xmlns:m="http://schemas.openxmlformats.org/officeDocument/2006/math" xmlns="" val="1"/>
+              <ma14:wrappingTextBoxFlag xmlns="" xmlns:m="http://schemas.openxmlformats.org/officeDocument/2006/math" xmlns:a14="http://schemas.microsoft.com/office/drawing/2010/main" xmlns:ma14="http://schemas.microsoft.com/office/mac/drawingml/2011/main" val="1"/>
             </a:ext>
           </a:extLst>
         </p:spPr>
@@ -7892,7 +7892,7 @@
           </a:ln>
           <a:extLst>
             <a:ext uri="{C572A759-6A51-4108-AA02-DFA0A04FC94B}">
-              <ma14:wrappingTextBoxFlag xmlns:ma14="http://schemas.microsoft.com/office/mac/drawingml/2011/main" xmlns:a14="http://schemas.microsoft.com/office/drawing/2010/main" xmlns:m="http://schemas.openxmlformats.org/officeDocument/2006/math" xmlns="" val="1"/>
+              <ma14:wrappingTextBoxFlag xmlns="" xmlns:m="http://schemas.openxmlformats.org/officeDocument/2006/math" xmlns:a14="http://schemas.microsoft.com/office/drawing/2010/main" xmlns:ma14="http://schemas.microsoft.com/office/mac/drawingml/2011/main" val="1"/>
             </a:ext>
           </a:extLst>
         </p:spPr>
@@ -7939,7 +7939,7 @@
           </a:ln>
           <a:extLst>
             <a:ext uri="{C572A759-6A51-4108-AA02-DFA0A04FC94B}">
-              <ma14:wrappingTextBoxFlag xmlns:ma14="http://schemas.microsoft.com/office/mac/drawingml/2011/main" xmlns:a14="http://schemas.microsoft.com/office/drawing/2010/main" xmlns:m="http://schemas.openxmlformats.org/officeDocument/2006/math" xmlns="" val="1"/>
+              <ma14:wrappingTextBoxFlag xmlns="" xmlns:m="http://schemas.openxmlformats.org/officeDocument/2006/math" xmlns:a14="http://schemas.microsoft.com/office/drawing/2010/main" xmlns:ma14="http://schemas.microsoft.com/office/mac/drawingml/2011/main" val="1"/>
             </a:ext>
           </a:extLst>
         </p:spPr>
@@ -8001,7 +8001,7 @@
           </a:ln>
           <a:extLst>
             <a:ext uri="{C572A759-6A51-4108-AA02-DFA0A04FC94B}">
-              <ma14:wrappingTextBoxFlag xmlns:ma14="http://schemas.microsoft.com/office/mac/drawingml/2011/main" xmlns:a14="http://schemas.microsoft.com/office/drawing/2010/main" xmlns:m="http://schemas.openxmlformats.org/officeDocument/2006/math" xmlns="" val="1"/>
+              <ma14:wrappingTextBoxFlag xmlns="" xmlns:m="http://schemas.openxmlformats.org/officeDocument/2006/math" xmlns:a14="http://schemas.microsoft.com/office/drawing/2010/main" xmlns:ma14="http://schemas.microsoft.com/office/mac/drawingml/2011/main" val="1"/>
             </a:ext>
           </a:extLst>
         </p:spPr>
@@ -8352,7 +8352,7 @@
           </a:ln>
           <a:extLst>
             <a:ext uri="{C572A759-6A51-4108-AA02-DFA0A04FC94B}">
-              <ma14:wrappingTextBoxFlag xmlns:ma14="http://schemas.microsoft.com/office/mac/drawingml/2011/main" xmlns:a14="http://schemas.microsoft.com/office/drawing/2010/main" xmlns:m="http://schemas.openxmlformats.org/officeDocument/2006/math" xmlns="" val="1"/>
+              <ma14:wrappingTextBoxFlag xmlns="" xmlns:m="http://schemas.openxmlformats.org/officeDocument/2006/math" xmlns:a14="http://schemas.microsoft.com/office/drawing/2010/main" xmlns:ma14="http://schemas.microsoft.com/office/mac/drawingml/2011/main" val="1"/>
             </a:ext>
           </a:extLst>
         </p:spPr>
@@ -8692,7 +8692,7 @@
           </a:ln>
           <a:extLst>
             <a:ext uri="{C572A759-6A51-4108-AA02-DFA0A04FC94B}">
-              <ma14:wrappingTextBoxFlag xmlns:ma14="http://schemas.microsoft.com/office/mac/drawingml/2011/main" xmlns:a14="http://schemas.microsoft.com/office/drawing/2010/main" xmlns:m="http://schemas.openxmlformats.org/officeDocument/2006/math" xmlns="" val="1"/>
+              <ma14:wrappingTextBoxFlag xmlns="" xmlns:m="http://schemas.openxmlformats.org/officeDocument/2006/math" xmlns:a14="http://schemas.microsoft.com/office/drawing/2010/main" xmlns:ma14="http://schemas.microsoft.com/office/mac/drawingml/2011/main" val="1"/>
             </a:ext>
           </a:extLst>
         </p:spPr>
@@ -8974,7 +8974,7 @@
           </a:ln>
           <a:extLst>
             <a:ext uri="{C572A759-6A51-4108-AA02-DFA0A04FC94B}">
-              <ma14:wrappingTextBoxFlag xmlns:ma14="http://schemas.microsoft.com/office/mac/drawingml/2011/main" xmlns:a14="http://schemas.microsoft.com/office/drawing/2010/main" xmlns:m="http://schemas.openxmlformats.org/officeDocument/2006/math" xmlns="" val="1"/>
+              <ma14:wrappingTextBoxFlag xmlns="" xmlns:m="http://schemas.openxmlformats.org/officeDocument/2006/math" xmlns:a14="http://schemas.microsoft.com/office/drawing/2010/main" xmlns:ma14="http://schemas.microsoft.com/office/mac/drawingml/2011/main" val="1"/>
             </a:ext>
           </a:extLst>
         </p:spPr>
@@ -9278,7 +9278,7 @@
           </a:ln>
           <a:extLst>
             <a:ext uri="{C572A759-6A51-4108-AA02-DFA0A04FC94B}">
-              <ma14:wrappingTextBoxFlag xmlns:ma14="http://schemas.microsoft.com/office/mac/drawingml/2011/main" xmlns:a14="http://schemas.microsoft.com/office/drawing/2010/main" xmlns:m="http://schemas.openxmlformats.org/officeDocument/2006/math" xmlns="" val="1"/>
+              <ma14:wrappingTextBoxFlag xmlns="" xmlns:m="http://schemas.openxmlformats.org/officeDocument/2006/math" xmlns:a14="http://schemas.microsoft.com/office/drawing/2010/main" xmlns:ma14="http://schemas.microsoft.com/office/mac/drawingml/2011/main" val="1"/>
             </a:ext>
           </a:extLst>
         </p:spPr>
@@ -9560,7 +9560,7 @@
           </a:ln>
           <a:extLst>
             <a:ext uri="{C572A759-6A51-4108-AA02-DFA0A04FC94B}">
-              <ma14:wrappingTextBoxFlag xmlns:ma14="http://schemas.microsoft.com/office/mac/drawingml/2011/main" xmlns:a14="http://schemas.microsoft.com/office/drawing/2010/main" xmlns:m="http://schemas.openxmlformats.org/officeDocument/2006/math" xmlns="" val="1"/>
+              <ma14:wrappingTextBoxFlag xmlns="" xmlns:m="http://schemas.openxmlformats.org/officeDocument/2006/math" xmlns:a14="http://schemas.microsoft.com/office/drawing/2010/main" xmlns:ma14="http://schemas.microsoft.com/office/mac/drawingml/2011/main" val="1"/>
             </a:ext>
           </a:extLst>
         </p:spPr>
@@ -9895,7 +9895,7 @@
           </a:ln>
           <a:extLst>
             <a:ext uri="{C572A759-6A51-4108-AA02-DFA0A04FC94B}">
-              <ma14:wrappingTextBoxFlag xmlns:ma14="http://schemas.microsoft.com/office/mac/drawingml/2011/main" xmlns:a14="http://schemas.microsoft.com/office/drawing/2010/main" xmlns:m="http://schemas.openxmlformats.org/officeDocument/2006/math" xmlns="" val="1"/>
+              <ma14:wrappingTextBoxFlag xmlns="" xmlns:m="http://schemas.openxmlformats.org/officeDocument/2006/math" xmlns:a14="http://schemas.microsoft.com/office/drawing/2010/main" xmlns:ma14="http://schemas.microsoft.com/office/mac/drawingml/2011/main" val="1"/>
             </a:ext>
           </a:extLst>
         </p:spPr>
@@ -10188,7 +10188,7 @@
           </a:ln>
           <a:extLst>
             <a:ext uri="{C572A759-6A51-4108-AA02-DFA0A04FC94B}">
-              <ma14:wrappingTextBoxFlag xmlns:ma14="http://schemas.microsoft.com/office/mac/drawingml/2011/main" xmlns:a14="http://schemas.microsoft.com/office/drawing/2010/main" xmlns:m="http://schemas.openxmlformats.org/officeDocument/2006/math" xmlns="" val="1"/>
+              <ma14:wrappingTextBoxFlag xmlns="" xmlns:m="http://schemas.openxmlformats.org/officeDocument/2006/math" xmlns:a14="http://schemas.microsoft.com/office/drawing/2010/main" xmlns:ma14="http://schemas.microsoft.com/office/mac/drawingml/2011/main" val="1"/>
             </a:ext>
           </a:extLst>
         </p:spPr>
@@ -10359,17 +10359,17 @@
               <a:t>“</a:t>
             </a:r>
             <a:r>
-              <a:rPr lang="en-US" b="1" dirty="0">
+              <a:rPr lang="en-US" b="0" dirty="0">
                 <a:solidFill>
                   <a:schemeClr val="bg2">
                     <a:lumMod val="90000"/>
                   </a:schemeClr>
                 </a:solidFill>
               </a:rPr>
-              <a:t>third</a:t>
-            </a:r>
-            <a:r>
-              <a:rPr b="1" dirty="0">
+              <a:t>second</a:t>
+            </a:r>
+            <a:r>
+              <a:rPr b="0" dirty="0">
                 <a:solidFill>
                   <a:schemeClr val="bg2">
                     <a:lumMod val="90000"/>
@@ -10379,7 +10379,7 @@
               <a:t>”:</a:t>
             </a:r>
             <a:r>
-              <a:rPr lang="en-US" b="1" dirty="0">
+              <a:rPr lang="en-US" b="0" dirty="0">
                 <a:solidFill>
                   <a:schemeClr val="bg2">
                     <a:lumMod val="90000"/>
@@ -10389,7 +10389,7 @@
               <a:t>7</a:t>
             </a:r>
             <a:r>
-              <a:rPr b="1" dirty="0">
+              <a:rPr b="0" dirty="0">
                 <a:solidFill>
                   <a:schemeClr val="bg2">
                     <a:lumMod val="90000"/>
@@ -10464,12 +10464,8 @@
                     <a:lumMod val="90000"/>
                   </a:schemeClr>
                 </a:solidFill>
-                <a:latin typeface="Gill Sans"/>
-                <a:ea typeface="Gill Sans"/>
-                <a:cs typeface="Gill Sans"/>
-                <a:sym typeface="Gill Sans"/>
               </a:rPr>
-              <a:t>7</a:t>
+              <a:t>8</a:t>
             </a:r>
             <a:r>
               <a:rPr dirty="0">
@@ -10513,7 +10509,7 @@
           </a:ln>
           <a:extLst>
             <a:ext uri="{C572A759-6A51-4108-AA02-DFA0A04FC94B}">
-              <ma14:wrappingTextBoxFlag xmlns:ma14="http://schemas.microsoft.com/office/mac/drawingml/2011/main" xmlns:a14="http://schemas.microsoft.com/office/drawing/2010/main" xmlns:m="http://schemas.openxmlformats.org/officeDocument/2006/math" xmlns="" val="1"/>
+              <ma14:wrappingTextBoxFlag xmlns="" xmlns:m="http://schemas.openxmlformats.org/officeDocument/2006/math" xmlns:a14="http://schemas.microsoft.com/office/drawing/2010/main" xmlns:ma14="http://schemas.microsoft.com/office/mac/drawingml/2011/main" val="1"/>
             </a:ext>
           </a:extLst>
         </p:spPr>
@@ -10561,7 +10557,7 @@
           </a:ln>
           <a:extLst>
             <a:ext uri="{C572A759-6A51-4108-AA02-DFA0A04FC94B}">
-              <ma14:wrappingTextBoxFlag xmlns:ma14="http://schemas.microsoft.com/office/mac/drawingml/2011/main" xmlns:a14="http://schemas.microsoft.com/office/drawing/2010/main" xmlns:m="http://schemas.openxmlformats.org/officeDocument/2006/math" xmlns="" val="1"/>
+              <ma14:wrappingTextBoxFlag xmlns="" xmlns:m="http://schemas.openxmlformats.org/officeDocument/2006/math" xmlns:a14="http://schemas.microsoft.com/office/drawing/2010/main" xmlns:ma14="http://schemas.microsoft.com/office/mac/drawingml/2011/main" val="1"/>
             </a:ext>
           </a:extLst>
         </p:spPr>
@@ -10609,7 +10605,7 @@
           </a:ln>
           <a:extLst>
             <a:ext uri="{C572A759-6A51-4108-AA02-DFA0A04FC94B}">
-              <ma14:wrappingTextBoxFlag xmlns:ma14="http://schemas.microsoft.com/office/mac/drawingml/2011/main" xmlns:a14="http://schemas.microsoft.com/office/drawing/2010/main" xmlns:m="http://schemas.openxmlformats.org/officeDocument/2006/math" xmlns="" val="1"/>
+              <ma14:wrappingTextBoxFlag xmlns="" xmlns:m="http://schemas.openxmlformats.org/officeDocument/2006/math" xmlns:a14="http://schemas.microsoft.com/office/drawing/2010/main" xmlns:ma14="http://schemas.microsoft.com/office/mac/drawingml/2011/main" val="1"/>
             </a:ext>
           </a:extLst>
         </p:spPr>
@@ -10662,7 +10658,7 @@
           </a:ln>
           <a:extLst>
             <a:ext uri="{C572A759-6A51-4108-AA02-DFA0A04FC94B}">
-              <ma14:wrappingTextBoxFlag xmlns:ma14="http://schemas.microsoft.com/office/mac/drawingml/2011/main" xmlns:a14="http://schemas.microsoft.com/office/drawing/2010/main" xmlns:m="http://schemas.openxmlformats.org/officeDocument/2006/math" xmlns="" val="1"/>
+              <ma14:wrappingTextBoxFlag xmlns="" xmlns:m="http://schemas.openxmlformats.org/officeDocument/2006/math" xmlns:a14="http://schemas.microsoft.com/office/drawing/2010/main" xmlns:ma14="http://schemas.microsoft.com/office/mac/drawingml/2011/main" val="1"/>
             </a:ext>
           </a:extLst>
         </p:spPr>
@@ -10715,7 +10711,7 @@
           </a:ln>
           <a:extLst>
             <a:ext uri="{C572A759-6A51-4108-AA02-DFA0A04FC94B}">
-              <ma14:wrappingTextBoxFlag xmlns:ma14="http://schemas.microsoft.com/office/mac/drawingml/2011/main" xmlns:a14="http://schemas.microsoft.com/office/drawing/2010/main" xmlns:m="http://schemas.openxmlformats.org/officeDocument/2006/math" xmlns="" val="1"/>
+              <ma14:wrappingTextBoxFlag xmlns="" xmlns:m="http://schemas.openxmlformats.org/officeDocument/2006/math" xmlns:a14="http://schemas.microsoft.com/office/drawing/2010/main" xmlns:ma14="http://schemas.microsoft.com/office/mac/drawingml/2011/main" val="1"/>
             </a:ext>
           </a:extLst>
         </p:spPr>
@@ -10768,7 +10764,7 @@
           </a:ln>
           <a:extLst>
             <a:ext uri="{C572A759-6A51-4108-AA02-DFA0A04FC94B}">
-              <ma14:wrappingTextBoxFlag xmlns:ma14="http://schemas.microsoft.com/office/mac/drawingml/2011/main" xmlns:a14="http://schemas.microsoft.com/office/drawing/2010/main" xmlns:m="http://schemas.openxmlformats.org/officeDocument/2006/math" xmlns="" val="1"/>
+              <ma14:wrappingTextBoxFlag xmlns="" xmlns:m="http://schemas.openxmlformats.org/officeDocument/2006/math" xmlns:a14="http://schemas.microsoft.com/office/drawing/2010/main" xmlns:ma14="http://schemas.microsoft.com/office/mac/drawingml/2011/main" val="1"/>
             </a:ext>
           </a:extLst>
         </p:spPr>
@@ -10815,7 +10811,7 @@
           </a:ln>
           <a:extLst>
             <a:ext uri="{C572A759-6A51-4108-AA02-DFA0A04FC94B}">
-              <ma14:wrappingTextBoxFlag xmlns:ma14="http://schemas.microsoft.com/office/mac/drawingml/2011/main" xmlns:a14="http://schemas.microsoft.com/office/drawing/2010/main" xmlns:m="http://schemas.openxmlformats.org/officeDocument/2006/math" xmlns="" val="1"/>
+              <ma14:wrappingTextBoxFlag xmlns="" xmlns:m="http://schemas.openxmlformats.org/officeDocument/2006/math" xmlns:a14="http://schemas.microsoft.com/office/drawing/2010/main" xmlns:ma14="http://schemas.microsoft.com/office/mac/drawingml/2011/main" val="1"/>
             </a:ext>
           </a:extLst>
         </p:spPr>
@@ -10871,7 +10867,7 @@
           </a:ln>
           <a:extLst>
             <a:ext uri="{C572A759-6A51-4108-AA02-DFA0A04FC94B}">
-              <ma14:wrappingTextBoxFlag xmlns:ma14="http://schemas.microsoft.com/office/mac/drawingml/2011/main" xmlns:a14="http://schemas.microsoft.com/office/drawing/2010/main" xmlns:m="http://schemas.openxmlformats.org/officeDocument/2006/math" xmlns="" val="1"/>
+              <ma14:wrappingTextBoxFlag xmlns="" xmlns:m="http://schemas.openxmlformats.org/officeDocument/2006/math" xmlns:a14="http://schemas.microsoft.com/office/drawing/2010/main" xmlns:ma14="http://schemas.microsoft.com/office/mac/drawingml/2011/main" val="1"/>
             </a:ext>
           </a:extLst>
         </p:spPr>
@@ -10927,7 +10923,7 @@
           </a:ln>
           <a:extLst>
             <a:ext uri="{C572A759-6A51-4108-AA02-DFA0A04FC94B}">
-              <ma14:wrappingTextBoxFlag xmlns:ma14="http://schemas.microsoft.com/office/mac/drawingml/2011/main" xmlns:a14="http://schemas.microsoft.com/office/drawing/2010/main" xmlns:m="http://schemas.openxmlformats.org/officeDocument/2006/math" xmlns="" val="1"/>
+              <ma14:wrappingTextBoxFlag xmlns="" xmlns:m="http://schemas.openxmlformats.org/officeDocument/2006/math" xmlns:a14="http://schemas.microsoft.com/office/drawing/2010/main" xmlns:ma14="http://schemas.microsoft.com/office/mac/drawingml/2011/main" val="1"/>
             </a:ext>
           </a:extLst>
         </p:spPr>
@@ -10983,7 +10979,7 @@
           </a:ln>
           <a:extLst>
             <a:ext uri="{C572A759-6A51-4108-AA02-DFA0A04FC94B}">
-              <ma14:wrappingTextBoxFlag xmlns:ma14="http://schemas.microsoft.com/office/mac/drawingml/2011/main" xmlns:a14="http://schemas.microsoft.com/office/drawing/2010/main" xmlns:m="http://schemas.openxmlformats.org/officeDocument/2006/math" xmlns="" val="1"/>
+              <ma14:wrappingTextBoxFlag xmlns="" xmlns:m="http://schemas.openxmlformats.org/officeDocument/2006/math" xmlns:a14="http://schemas.microsoft.com/office/drawing/2010/main" xmlns:ma14="http://schemas.microsoft.com/office/mac/drawingml/2011/main" val="1"/>
             </a:ext>
           </a:extLst>
         </p:spPr>
@@ -11030,7 +11026,7 @@
           </a:ln>
           <a:extLst>
             <a:ext uri="{C572A759-6A51-4108-AA02-DFA0A04FC94B}">
-              <ma14:wrappingTextBoxFlag xmlns:ma14="http://schemas.microsoft.com/office/mac/drawingml/2011/main" xmlns:a14="http://schemas.microsoft.com/office/drawing/2010/main" xmlns:m="http://schemas.openxmlformats.org/officeDocument/2006/math" xmlns="" val="1"/>
+              <ma14:wrappingTextBoxFlag xmlns="" xmlns:m="http://schemas.openxmlformats.org/officeDocument/2006/math" xmlns:a14="http://schemas.microsoft.com/office/drawing/2010/main" xmlns:ma14="http://schemas.microsoft.com/office/mac/drawingml/2011/main" val="1"/>
             </a:ext>
           </a:extLst>
         </p:spPr>
@@ -11077,7 +11073,7 @@
           </a:ln>
           <a:extLst>
             <a:ext uri="{C572A759-6A51-4108-AA02-DFA0A04FC94B}">
-              <ma14:wrappingTextBoxFlag xmlns:ma14="http://schemas.microsoft.com/office/mac/drawingml/2011/main" xmlns:a14="http://schemas.microsoft.com/office/drawing/2010/main" xmlns:m="http://schemas.openxmlformats.org/officeDocument/2006/math" xmlns="" val="1"/>
+              <ma14:wrappingTextBoxFlag xmlns="" xmlns:m="http://schemas.openxmlformats.org/officeDocument/2006/math" xmlns:a14="http://schemas.microsoft.com/office/drawing/2010/main" xmlns:ma14="http://schemas.microsoft.com/office/mac/drawingml/2011/main" val="1"/>
             </a:ext>
           </a:extLst>
         </p:spPr>
@@ -11165,7 +11161,7 @@
           </a:ln>
           <a:extLst>
             <a:ext uri="{C572A759-6A51-4108-AA02-DFA0A04FC94B}">
-              <ma14:wrappingTextBoxFlag xmlns:ma14="http://schemas.microsoft.com/office/mac/drawingml/2011/main" xmlns:a14="http://schemas.microsoft.com/office/drawing/2010/main" xmlns:m="http://schemas.openxmlformats.org/officeDocument/2006/math" xmlns="" val="1"/>
+              <ma14:wrappingTextBoxFlag xmlns="" xmlns:m="http://schemas.openxmlformats.org/officeDocument/2006/math" xmlns:a14="http://schemas.microsoft.com/office/drawing/2010/main" xmlns:ma14="http://schemas.microsoft.com/office/mac/drawingml/2011/main" val="1"/>
             </a:ext>
           </a:extLst>
         </p:spPr>
@@ -11250,7 +11246,7 @@
           </a:ln>
           <a:extLst>
             <a:ext uri="{C572A759-6A51-4108-AA02-DFA0A04FC94B}">
-              <ma14:wrappingTextBoxFlag xmlns:ma14="http://schemas.microsoft.com/office/mac/drawingml/2011/main" xmlns:a14="http://schemas.microsoft.com/office/drawing/2010/main" xmlns:m="http://schemas.openxmlformats.org/officeDocument/2006/math" xmlns="" val="1"/>
+              <ma14:wrappingTextBoxFlag xmlns="" xmlns:m="http://schemas.openxmlformats.org/officeDocument/2006/math" xmlns:a14="http://schemas.microsoft.com/office/drawing/2010/main" xmlns:ma14="http://schemas.microsoft.com/office/mac/drawingml/2011/main" val="1"/>
             </a:ext>
           </a:extLst>
         </p:spPr>
@@ -11308,7 +11304,7 @@
           </a:ln>
           <a:extLst>
             <a:ext uri="{C572A759-6A51-4108-AA02-DFA0A04FC94B}">
-              <ma14:wrappingTextBoxFlag xmlns:ma14="http://schemas.microsoft.com/office/mac/drawingml/2011/main" xmlns:a14="http://schemas.microsoft.com/office/drawing/2010/main" xmlns:m="http://schemas.openxmlformats.org/officeDocument/2006/math" xmlns="" val="1"/>
+              <ma14:wrappingTextBoxFlag xmlns="" xmlns:m="http://schemas.openxmlformats.org/officeDocument/2006/math" xmlns:a14="http://schemas.microsoft.com/office/drawing/2010/main" xmlns:ma14="http://schemas.microsoft.com/office/mac/drawingml/2011/main" val="1"/>
             </a:ext>
           </a:extLst>
         </p:spPr>
@@ -11351,7 +11347,7 @@
           </a:ln>
           <a:extLst>
             <a:ext uri="{C572A759-6A51-4108-AA02-DFA0A04FC94B}">
-              <ma14:wrappingTextBoxFlag xmlns:ma14="http://schemas.microsoft.com/office/mac/drawingml/2011/main" xmlns:a14="http://schemas.microsoft.com/office/drawing/2010/main" xmlns:m="http://schemas.openxmlformats.org/officeDocument/2006/math" xmlns="" val="1"/>
+              <ma14:wrappingTextBoxFlag xmlns="" xmlns:m="http://schemas.openxmlformats.org/officeDocument/2006/math" xmlns:a14="http://schemas.microsoft.com/office/drawing/2010/main" xmlns:ma14="http://schemas.microsoft.com/office/mac/drawingml/2011/main" val="1"/>
             </a:ext>
           </a:extLst>
         </p:spPr>
@@ -11394,7 +11390,7 @@
           </a:ln>
           <a:extLst>
             <a:ext uri="{C572A759-6A51-4108-AA02-DFA0A04FC94B}">
-              <ma14:wrappingTextBoxFlag xmlns:ma14="http://schemas.microsoft.com/office/mac/drawingml/2011/main" xmlns:a14="http://schemas.microsoft.com/office/drawing/2010/main" xmlns:m="http://schemas.openxmlformats.org/officeDocument/2006/math" xmlns="" val="1"/>
+              <ma14:wrappingTextBoxFlag xmlns="" xmlns:m="http://schemas.openxmlformats.org/officeDocument/2006/math" xmlns:a14="http://schemas.microsoft.com/office/drawing/2010/main" xmlns:ma14="http://schemas.microsoft.com/office/mac/drawingml/2011/main" val="1"/>
             </a:ext>
           </a:extLst>
         </p:spPr>
@@ -11437,7 +11433,7 @@
           </a:ln>
           <a:extLst>
             <a:ext uri="{C572A759-6A51-4108-AA02-DFA0A04FC94B}">
-              <ma14:wrappingTextBoxFlag xmlns:ma14="http://schemas.microsoft.com/office/mac/drawingml/2011/main" xmlns:a14="http://schemas.microsoft.com/office/drawing/2010/main" xmlns:m="http://schemas.openxmlformats.org/officeDocument/2006/math" xmlns="" val="1"/>
+              <ma14:wrappingTextBoxFlag xmlns="" xmlns:m="http://schemas.openxmlformats.org/officeDocument/2006/math" xmlns:a14="http://schemas.microsoft.com/office/drawing/2010/main" xmlns:ma14="http://schemas.microsoft.com/office/mac/drawingml/2011/main" val="1"/>
             </a:ext>
           </a:extLst>
         </p:spPr>
@@ -11480,7 +11476,7 @@
           </a:ln>
           <a:extLst>
             <a:ext uri="{C572A759-6A51-4108-AA02-DFA0A04FC94B}">
-              <ma14:wrappingTextBoxFlag xmlns:ma14="http://schemas.microsoft.com/office/mac/drawingml/2011/main" xmlns:a14="http://schemas.microsoft.com/office/drawing/2010/main" xmlns:m="http://schemas.openxmlformats.org/officeDocument/2006/math" xmlns="" val="1"/>
+              <ma14:wrappingTextBoxFlag xmlns="" xmlns:m="http://schemas.openxmlformats.org/officeDocument/2006/math" xmlns:a14="http://schemas.microsoft.com/office/drawing/2010/main" xmlns:ma14="http://schemas.microsoft.com/office/mac/drawingml/2011/main" val="1"/>
             </a:ext>
           </a:extLst>
         </p:spPr>
@@ -11523,7 +11519,7 @@
           </a:ln>
           <a:extLst>
             <a:ext uri="{C572A759-6A51-4108-AA02-DFA0A04FC94B}">
-              <ma14:wrappingTextBoxFlag xmlns:ma14="http://schemas.microsoft.com/office/mac/drawingml/2011/main" xmlns:a14="http://schemas.microsoft.com/office/drawing/2010/main" xmlns:m="http://schemas.openxmlformats.org/officeDocument/2006/math" xmlns="" val="1"/>
+              <ma14:wrappingTextBoxFlag xmlns="" xmlns:m="http://schemas.openxmlformats.org/officeDocument/2006/math" xmlns:a14="http://schemas.microsoft.com/office/drawing/2010/main" xmlns:ma14="http://schemas.microsoft.com/office/mac/drawingml/2011/main" val="1"/>
             </a:ext>
           </a:extLst>
         </p:spPr>
@@ -11727,7 +11723,7 @@
           </a:ln>
           <a:extLst>
             <a:ext uri="{C572A759-6A51-4108-AA02-DFA0A04FC94B}">
-              <ma14:wrappingTextBoxFlag xmlns:ma14="http://schemas.microsoft.com/office/mac/drawingml/2011/main" xmlns:a14="http://schemas.microsoft.com/office/drawing/2010/main" xmlns:m="http://schemas.openxmlformats.org/officeDocument/2006/math" xmlns="" val="1"/>
+              <ma14:wrappingTextBoxFlag xmlns="" xmlns:m="http://schemas.openxmlformats.org/officeDocument/2006/math" xmlns:a14="http://schemas.microsoft.com/office/drawing/2010/main" xmlns:ma14="http://schemas.microsoft.com/office/mac/drawingml/2011/main" val="1"/>
             </a:ext>
           </a:extLst>
         </p:spPr>
@@ -11789,7 +11785,7 @@
           </a:ln>
           <a:extLst>
             <a:ext uri="{C572A759-6A51-4108-AA02-DFA0A04FC94B}">
-              <ma14:wrappingTextBoxFlag xmlns:ma14="http://schemas.microsoft.com/office/mac/drawingml/2011/main" xmlns:a14="http://schemas.microsoft.com/office/drawing/2010/main" xmlns:m="http://schemas.openxmlformats.org/officeDocument/2006/math" xmlns="" val="1"/>
+              <ma14:wrappingTextBoxFlag xmlns="" xmlns:m="http://schemas.openxmlformats.org/officeDocument/2006/math" xmlns:a14="http://schemas.microsoft.com/office/drawing/2010/main" xmlns:ma14="http://schemas.microsoft.com/office/mac/drawingml/2011/main" val="1"/>
             </a:ext>
           </a:extLst>
         </p:spPr>
@@ -11853,7 +11849,7 @@
           </a:ln>
           <a:extLst>
             <a:ext uri="{C572A759-6A51-4108-AA02-DFA0A04FC94B}">
-              <ma14:wrappingTextBoxFlag xmlns:ma14="http://schemas.microsoft.com/office/mac/drawingml/2011/main" xmlns:a14="http://schemas.microsoft.com/office/drawing/2010/main" xmlns:m="http://schemas.openxmlformats.org/officeDocument/2006/math" xmlns="" val="1"/>
+              <ma14:wrappingTextBoxFlag xmlns="" xmlns:m="http://schemas.openxmlformats.org/officeDocument/2006/math" xmlns:a14="http://schemas.microsoft.com/office/drawing/2010/main" xmlns:ma14="http://schemas.microsoft.com/office/mac/drawingml/2011/main" val="1"/>
             </a:ext>
           </a:extLst>
         </p:spPr>
@@ -11915,7 +11911,7 @@
           </a:ln>
           <a:extLst>
             <a:ext uri="{C572A759-6A51-4108-AA02-DFA0A04FC94B}">
-              <ma14:wrappingTextBoxFlag xmlns:ma14="http://schemas.microsoft.com/office/mac/drawingml/2011/main" xmlns:a14="http://schemas.microsoft.com/office/drawing/2010/main" xmlns:m="http://schemas.openxmlformats.org/officeDocument/2006/math" xmlns="" val="1"/>
+              <ma14:wrappingTextBoxFlag xmlns="" xmlns:m="http://schemas.openxmlformats.org/officeDocument/2006/math" xmlns:a14="http://schemas.microsoft.com/office/drawing/2010/main" xmlns:ma14="http://schemas.microsoft.com/office/mac/drawingml/2011/main" val="1"/>
             </a:ext>
           </a:extLst>
         </p:spPr>
@@ -11954,7 +11950,7 @@
           </a:ln>
           <a:extLst>
             <a:ext uri="{C572A759-6A51-4108-AA02-DFA0A04FC94B}">
-              <ma14:wrappingTextBoxFlag xmlns:ma14="http://schemas.microsoft.com/office/mac/drawingml/2011/main" xmlns:a14="http://schemas.microsoft.com/office/drawing/2010/main" xmlns:m="http://schemas.openxmlformats.org/officeDocument/2006/math" xmlns="" val="1"/>
+              <ma14:wrappingTextBoxFlag xmlns="" xmlns:m="http://schemas.openxmlformats.org/officeDocument/2006/math" xmlns:a14="http://schemas.microsoft.com/office/drawing/2010/main" xmlns:ma14="http://schemas.microsoft.com/office/mac/drawingml/2011/main" val="1"/>
             </a:ext>
           </a:extLst>
         </p:spPr>
@@ -11993,7 +11989,7 @@
           </a:ln>
           <a:extLst>
             <a:ext uri="{C572A759-6A51-4108-AA02-DFA0A04FC94B}">
-              <ma14:wrappingTextBoxFlag xmlns:ma14="http://schemas.microsoft.com/office/mac/drawingml/2011/main" xmlns:a14="http://schemas.microsoft.com/office/drawing/2010/main" xmlns:m="http://schemas.openxmlformats.org/officeDocument/2006/math" xmlns="" val="1"/>
+              <ma14:wrappingTextBoxFlag xmlns="" xmlns:m="http://schemas.openxmlformats.org/officeDocument/2006/math" xmlns:a14="http://schemas.microsoft.com/office/drawing/2010/main" xmlns:ma14="http://schemas.microsoft.com/office/mac/drawingml/2011/main" val="1"/>
             </a:ext>
           </a:extLst>
         </p:spPr>
@@ -12036,7 +12032,7 @@
           </a:ln>
           <a:extLst>
             <a:ext uri="{C572A759-6A51-4108-AA02-DFA0A04FC94B}">
-              <ma14:wrappingTextBoxFlag xmlns:ma14="http://schemas.microsoft.com/office/mac/drawingml/2011/main" xmlns:a14="http://schemas.microsoft.com/office/drawing/2010/main" xmlns:m="http://schemas.openxmlformats.org/officeDocument/2006/math" xmlns="" val="1"/>
+              <ma14:wrappingTextBoxFlag xmlns="" xmlns:m="http://schemas.openxmlformats.org/officeDocument/2006/math" xmlns:a14="http://schemas.microsoft.com/office/drawing/2010/main" xmlns:ma14="http://schemas.microsoft.com/office/mac/drawingml/2011/main" val="1"/>
             </a:ext>
           </a:extLst>
         </p:spPr>
@@ -12079,7 +12075,7 @@
           </a:ln>
           <a:extLst>
             <a:ext uri="{C572A759-6A51-4108-AA02-DFA0A04FC94B}">
-              <ma14:wrappingTextBoxFlag xmlns:ma14="http://schemas.microsoft.com/office/mac/drawingml/2011/main" xmlns:a14="http://schemas.microsoft.com/office/drawing/2010/main" xmlns:m="http://schemas.openxmlformats.org/officeDocument/2006/math" xmlns="" val="1"/>
+              <ma14:wrappingTextBoxFlag xmlns="" xmlns:m="http://schemas.openxmlformats.org/officeDocument/2006/math" xmlns:a14="http://schemas.microsoft.com/office/drawing/2010/main" xmlns:ma14="http://schemas.microsoft.com/office/mac/drawingml/2011/main" val="1"/>
             </a:ext>
           </a:extLst>
         </p:spPr>
@@ -12133,7 +12129,7 @@
           </a:ln>
           <a:extLst>
             <a:ext uri="{C572A759-6A51-4108-AA02-DFA0A04FC94B}">
-              <ma14:wrappingTextBoxFlag xmlns:ma14="http://schemas.microsoft.com/office/mac/drawingml/2011/main" xmlns:a14="http://schemas.microsoft.com/office/drawing/2010/main" xmlns:m="http://schemas.openxmlformats.org/officeDocument/2006/math" xmlns="" val="1"/>
+              <ma14:wrappingTextBoxFlag xmlns="" xmlns:m="http://schemas.openxmlformats.org/officeDocument/2006/math" xmlns:a14="http://schemas.microsoft.com/office/drawing/2010/main" xmlns:ma14="http://schemas.microsoft.com/office/mac/drawingml/2011/main" val="1"/>
             </a:ext>
           </a:extLst>
         </p:spPr>
@@ -12187,7 +12183,7 @@
           </a:ln>
           <a:extLst>
             <a:ext uri="{C572A759-6A51-4108-AA02-DFA0A04FC94B}">
-              <ma14:wrappingTextBoxFlag xmlns:ma14="http://schemas.microsoft.com/office/mac/drawingml/2011/main" xmlns:a14="http://schemas.microsoft.com/office/drawing/2010/main" xmlns:m="http://schemas.openxmlformats.org/officeDocument/2006/math" xmlns="" val="1"/>
+              <ma14:wrappingTextBoxFlag xmlns="" xmlns:m="http://schemas.openxmlformats.org/officeDocument/2006/math" xmlns:a14="http://schemas.microsoft.com/office/drawing/2010/main" xmlns:ma14="http://schemas.microsoft.com/office/mac/drawingml/2011/main" val="1"/>
             </a:ext>
           </a:extLst>
         </p:spPr>
@@ -12240,7 +12236,7 @@
           </a:ln>
           <a:extLst>
             <a:ext uri="{C572A759-6A51-4108-AA02-DFA0A04FC94B}">
-              <ma14:wrappingTextBoxFlag xmlns:ma14="http://schemas.microsoft.com/office/mac/drawingml/2011/main" xmlns:a14="http://schemas.microsoft.com/office/drawing/2010/main" xmlns:m="http://schemas.openxmlformats.org/officeDocument/2006/math" xmlns="" val="1"/>
+              <ma14:wrappingTextBoxFlag xmlns="" xmlns:m="http://schemas.openxmlformats.org/officeDocument/2006/math" xmlns:a14="http://schemas.microsoft.com/office/drawing/2010/main" xmlns:ma14="http://schemas.microsoft.com/office/mac/drawingml/2011/main" val="1"/>
             </a:ext>
           </a:extLst>
         </p:spPr>
@@ -12294,7 +12290,7 @@
           </a:ln>
           <a:extLst>
             <a:ext uri="{C572A759-6A51-4108-AA02-DFA0A04FC94B}">
-              <ma14:wrappingTextBoxFlag xmlns:ma14="http://schemas.microsoft.com/office/mac/drawingml/2011/main" xmlns:a14="http://schemas.microsoft.com/office/drawing/2010/main" xmlns:m="http://schemas.openxmlformats.org/officeDocument/2006/math" xmlns="" val="1"/>
+              <ma14:wrappingTextBoxFlag xmlns="" xmlns:m="http://schemas.openxmlformats.org/officeDocument/2006/math" xmlns:a14="http://schemas.microsoft.com/office/drawing/2010/main" xmlns:ma14="http://schemas.microsoft.com/office/mac/drawingml/2011/main" val="1"/>
             </a:ext>
           </a:extLst>
         </p:spPr>
@@ -12347,7 +12343,7 @@
           </a:ln>
           <a:extLst>
             <a:ext uri="{C572A759-6A51-4108-AA02-DFA0A04FC94B}">
-              <ma14:wrappingTextBoxFlag xmlns:ma14="http://schemas.microsoft.com/office/mac/drawingml/2011/main" xmlns:a14="http://schemas.microsoft.com/office/drawing/2010/main" xmlns:m="http://schemas.openxmlformats.org/officeDocument/2006/math" xmlns="" val="1"/>
+              <ma14:wrappingTextBoxFlag xmlns="" xmlns:m="http://schemas.openxmlformats.org/officeDocument/2006/math" xmlns:a14="http://schemas.microsoft.com/office/drawing/2010/main" xmlns:ma14="http://schemas.microsoft.com/office/mac/drawingml/2011/main" val="1"/>
             </a:ext>
           </a:extLst>
         </p:spPr>
@@ -12397,7 +12393,7 @@
           </a:ln>
           <a:extLst>
             <a:ext uri="{C572A759-6A51-4108-AA02-DFA0A04FC94B}">
-              <ma14:wrappingTextBoxFlag xmlns:ma14="http://schemas.microsoft.com/office/mac/drawingml/2011/main" xmlns:a14="http://schemas.microsoft.com/office/drawing/2010/main" xmlns:m="http://schemas.openxmlformats.org/officeDocument/2006/math" xmlns="" val="1"/>
+              <ma14:wrappingTextBoxFlag xmlns="" xmlns:m="http://schemas.openxmlformats.org/officeDocument/2006/math" xmlns:a14="http://schemas.microsoft.com/office/drawing/2010/main" xmlns:ma14="http://schemas.microsoft.com/office/mac/drawingml/2011/main" val="1"/>
             </a:ext>
           </a:extLst>
         </p:spPr>
@@ -12441,7 +12437,7 @@
           </a:ln>
           <a:extLst>
             <a:ext uri="{C572A759-6A51-4108-AA02-DFA0A04FC94B}">
-              <ma14:wrappingTextBoxFlag xmlns:ma14="http://schemas.microsoft.com/office/mac/drawingml/2011/main" xmlns:a14="http://schemas.microsoft.com/office/drawing/2010/main" xmlns:m="http://schemas.openxmlformats.org/officeDocument/2006/math" xmlns="" val="1"/>
+              <ma14:wrappingTextBoxFlag xmlns="" xmlns:m="http://schemas.openxmlformats.org/officeDocument/2006/math" xmlns:a14="http://schemas.microsoft.com/office/drawing/2010/main" xmlns:ma14="http://schemas.microsoft.com/office/mac/drawingml/2011/main" val="1"/>
             </a:ext>
           </a:extLst>
         </p:spPr>
@@ -12485,7 +12481,7 @@
           </a:ln>
           <a:extLst>
             <a:ext uri="{C572A759-6A51-4108-AA02-DFA0A04FC94B}">
-              <ma14:wrappingTextBoxFlag xmlns:ma14="http://schemas.microsoft.com/office/mac/drawingml/2011/main" xmlns:a14="http://schemas.microsoft.com/office/drawing/2010/main" xmlns:m="http://schemas.openxmlformats.org/officeDocument/2006/math" xmlns="" val="1"/>
+              <ma14:wrappingTextBoxFlag xmlns="" xmlns:m="http://schemas.openxmlformats.org/officeDocument/2006/math" xmlns:a14="http://schemas.microsoft.com/office/drawing/2010/main" xmlns:ma14="http://schemas.microsoft.com/office/mac/drawingml/2011/main" val="1"/>
             </a:ext>
           </a:extLst>
         </p:spPr>
@@ -12529,7 +12525,7 @@
           </a:ln>
           <a:extLst>
             <a:ext uri="{C572A759-6A51-4108-AA02-DFA0A04FC94B}">
-              <ma14:wrappingTextBoxFlag xmlns:ma14="http://schemas.microsoft.com/office/mac/drawingml/2011/main" xmlns:a14="http://schemas.microsoft.com/office/drawing/2010/main" xmlns:m="http://schemas.openxmlformats.org/officeDocument/2006/math" xmlns="" val="1"/>
+              <ma14:wrappingTextBoxFlag xmlns="" xmlns:m="http://schemas.openxmlformats.org/officeDocument/2006/math" xmlns:a14="http://schemas.microsoft.com/office/drawing/2010/main" xmlns:ma14="http://schemas.microsoft.com/office/mac/drawingml/2011/main" val="1"/>
             </a:ext>
           </a:extLst>
         </p:spPr>
@@ -12573,7 +12569,7 @@
           </a:ln>
           <a:extLst>
             <a:ext uri="{C572A759-6A51-4108-AA02-DFA0A04FC94B}">
-              <ma14:wrappingTextBoxFlag xmlns:ma14="http://schemas.microsoft.com/office/mac/drawingml/2011/main" xmlns:a14="http://schemas.microsoft.com/office/drawing/2010/main" xmlns:m="http://schemas.openxmlformats.org/officeDocument/2006/math" xmlns="" val="1"/>
+              <ma14:wrappingTextBoxFlag xmlns="" xmlns:m="http://schemas.openxmlformats.org/officeDocument/2006/math" xmlns:a14="http://schemas.microsoft.com/office/drawing/2010/main" xmlns:ma14="http://schemas.microsoft.com/office/mac/drawingml/2011/main" val="1"/>
             </a:ext>
           </a:extLst>
         </p:spPr>
@@ -12617,7 +12613,7 @@
           </a:ln>
           <a:extLst>
             <a:ext uri="{C572A759-6A51-4108-AA02-DFA0A04FC94B}">
-              <ma14:wrappingTextBoxFlag xmlns:ma14="http://schemas.microsoft.com/office/mac/drawingml/2011/main" xmlns:a14="http://schemas.microsoft.com/office/drawing/2010/main" xmlns:m="http://schemas.openxmlformats.org/officeDocument/2006/math" xmlns="" val="1"/>
+              <ma14:wrappingTextBoxFlag xmlns="" xmlns:m="http://schemas.openxmlformats.org/officeDocument/2006/math" xmlns:a14="http://schemas.microsoft.com/office/drawing/2010/main" xmlns:ma14="http://schemas.microsoft.com/office/mac/drawingml/2011/main" val="1"/>
             </a:ext>
           </a:extLst>
         </p:spPr>
@@ -12661,7 +12657,7 @@
           </a:ln>
           <a:extLst>
             <a:ext uri="{C572A759-6A51-4108-AA02-DFA0A04FC94B}">
-              <ma14:wrappingTextBoxFlag xmlns:ma14="http://schemas.microsoft.com/office/mac/drawingml/2011/main" xmlns:a14="http://schemas.microsoft.com/office/drawing/2010/main" xmlns:m="http://schemas.openxmlformats.org/officeDocument/2006/math" xmlns="" val="1"/>
+              <ma14:wrappingTextBoxFlag xmlns="" xmlns:m="http://schemas.openxmlformats.org/officeDocument/2006/math" xmlns:a14="http://schemas.microsoft.com/office/drawing/2010/main" xmlns:ma14="http://schemas.microsoft.com/office/mac/drawingml/2011/main" val="1"/>
             </a:ext>
           </a:extLst>
         </p:spPr>
@@ -12705,7 +12701,7 @@
           </a:ln>
           <a:extLst>
             <a:ext uri="{C572A759-6A51-4108-AA02-DFA0A04FC94B}">
-              <ma14:wrappingTextBoxFlag xmlns:ma14="http://schemas.microsoft.com/office/mac/drawingml/2011/main" xmlns:a14="http://schemas.microsoft.com/office/drawing/2010/main" xmlns:m="http://schemas.openxmlformats.org/officeDocument/2006/math" xmlns="" val="1"/>
+              <ma14:wrappingTextBoxFlag xmlns="" xmlns:m="http://schemas.openxmlformats.org/officeDocument/2006/math" xmlns:a14="http://schemas.microsoft.com/office/drawing/2010/main" xmlns:ma14="http://schemas.microsoft.com/office/mac/drawingml/2011/main" val="1"/>
             </a:ext>
           </a:extLst>
         </p:spPr>
@@ -13142,7 +13138,7 @@
           </a:ln>
           <a:extLst>
             <a:ext uri="{C572A759-6A51-4108-AA02-DFA0A04FC94B}">
-              <ma14:wrappingTextBoxFlag xmlns:ma14="http://schemas.microsoft.com/office/mac/drawingml/2011/main" xmlns:a14="http://schemas.microsoft.com/office/drawing/2010/main" xmlns:m="http://schemas.openxmlformats.org/officeDocument/2006/math" xmlns="" val="1"/>
+              <ma14:wrappingTextBoxFlag xmlns="" xmlns:m="http://schemas.openxmlformats.org/officeDocument/2006/math" xmlns:a14="http://schemas.microsoft.com/office/drawing/2010/main" xmlns:ma14="http://schemas.microsoft.com/office/mac/drawingml/2011/main" val="1"/>
             </a:ext>
           </a:extLst>
         </p:spPr>
@@ -13206,7 +13202,7 @@
           </a:ln>
           <a:extLst>
             <a:ext uri="{C572A759-6A51-4108-AA02-DFA0A04FC94B}">
-              <ma14:wrappingTextBoxFlag xmlns:ma14="http://schemas.microsoft.com/office/mac/drawingml/2011/main" xmlns:a14="http://schemas.microsoft.com/office/drawing/2010/main" xmlns:m="http://schemas.openxmlformats.org/officeDocument/2006/math" xmlns="" val="1"/>
+              <ma14:wrappingTextBoxFlag xmlns="" xmlns:m="http://schemas.openxmlformats.org/officeDocument/2006/math" xmlns:a14="http://schemas.microsoft.com/office/drawing/2010/main" xmlns:ma14="http://schemas.microsoft.com/office/mac/drawingml/2011/main" val="1"/>
             </a:ext>
           </a:extLst>
         </p:spPr>
@@ -13260,7 +13256,7 @@
           </a:ln>
           <a:extLst>
             <a:ext uri="{C572A759-6A51-4108-AA02-DFA0A04FC94B}">
-              <ma14:wrappingTextBoxFlag xmlns:ma14="http://schemas.microsoft.com/office/mac/drawingml/2011/main" xmlns:a14="http://schemas.microsoft.com/office/drawing/2010/main" xmlns:m="http://schemas.openxmlformats.org/officeDocument/2006/math" xmlns="" val="1"/>
+              <ma14:wrappingTextBoxFlag xmlns="" xmlns:m="http://schemas.openxmlformats.org/officeDocument/2006/math" xmlns:a14="http://schemas.microsoft.com/office/drawing/2010/main" xmlns:ma14="http://schemas.microsoft.com/office/mac/drawingml/2011/main" val="1"/>
             </a:ext>
           </a:extLst>
         </p:spPr>
@@ -13311,7 +13307,7 @@
           </a:ln>
           <a:extLst>
             <a:ext uri="{C572A759-6A51-4108-AA02-DFA0A04FC94B}">
-              <ma14:wrappingTextBoxFlag xmlns:ma14="http://schemas.microsoft.com/office/mac/drawingml/2011/main" xmlns:a14="http://schemas.microsoft.com/office/drawing/2010/main" xmlns:m="http://schemas.openxmlformats.org/officeDocument/2006/math" xmlns="" val="1"/>
+              <ma14:wrappingTextBoxFlag xmlns="" xmlns:m="http://schemas.openxmlformats.org/officeDocument/2006/math" xmlns:a14="http://schemas.microsoft.com/office/drawing/2010/main" xmlns:ma14="http://schemas.microsoft.com/office/mac/drawingml/2011/main" val="1"/>
             </a:ext>
           </a:extLst>
         </p:spPr>
@@ -13387,7 +13383,7 @@
           </a:ln>
           <a:extLst>
             <a:ext uri="{C572A759-6A51-4108-AA02-DFA0A04FC94B}">
-              <ma14:wrappingTextBoxFlag xmlns:ma14="http://schemas.microsoft.com/office/mac/drawingml/2011/main" xmlns:a14="http://schemas.microsoft.com/office/drawing/2010/main" xmlns:m="http://schemas.openxmlformats.org/officeDocument/2006/math" xmlns="" val="1"/>
+              <ma14:wrappingTextBoxFlag xmlns="" xmlns:m="http://schemas.openxmlformats.org/officeDocument/2006/math" xmlns:a14="http://schemas.microsoft.com/office/drawing/2010/main" xmlns:ma14="http://schemas.microsoft.com/office/mac/drawingml/2011/main" val="1"/>
             </a:ext>
           </a:extLst>
         </p:spPr>
@@ -13521,7 +13517,7 @@
           </a:ln>
           <a:extLst>
             <a:ext uri="{C572A759-6A51-4108-AA02-DFA0A04FC94B}">
-              <ma14:wrappingTextBoxFlag xmlns:ma14="http://schemas.microsoft.com/office/mac/drawingml/2011/main" xmlns:a14="http://schemas.microsoft.com/office/drawing/2010/main" xmlns:m="http://schemas.openxmlformats.org/officeDocument/2006/math" xmlns="" val="1"/>
+              <ma14:wrappingTextBoxFlag xmlns="" xmlns:m="http://schemas.openxmlformats.org/officeDocument/2006/math" xmlns:a14="http://schemas.microsoft.com/office/drawing/2010/main" xmlns:ma14="http://schemas.microsoft.com/office/mac/drawingml/2011/main" val="1"/>
             </a:ext>
           </a:extLst>
         </p:spPr>
@@ -13591,7 +13587,7 @@
           </a:ln>
           <a:extLst>
             <a:ext uri="{C572A759-6A51-4108-AA02-DFA0A04FC94B}">
-              <ma14:wrappingTextBoxFlag xmlns:ma14="http://schemas.microsoft.com/office/mac/drawingml/2011/main" xmlns:a14="http://schemas.microsoft.com/office/drawing/2010/main" xmlns:m="http://schemas.openxmlformats.org/officeDocument/2006/math" xmlns="" val="1"/>
+              <ma14:wrappingTextBoxFlag xmlns="" xmlns:m="http://schemas.openxmlformats.org/officeDocument/2006/math" xmlns:a14="http://schemas.microsoft.com/office/drawing/2010/main" xmlns:ma14="http://schemas.microsoft.com/office/mac/drawingml/2011/main" val="1"/>
             </a:ext>
           </a:extLst>
         </p:spPr>
@@ -13648,7 +13644,7 @@
           </a:ln>
           <a:extLst>
             <a:ext uri="{C572A759-6A51-4108-AA02-DFA0A04FC94B}">
-              <ma14:wrappingTextBoxFlag xmlns:ma14="http://schemas.microsoft.com/office/mac/drawingml/2011/main" xmlns:a14="http://schemas.microsoft.com/office/drawing/2010/main" xmlns:m="http://schemas.openxmlformats.org/officeDocument/2006/math" xmlns="" val="1"/>
+              <ma14:wrappingTextBoxFlag xmlns="" xmlns:m="http://schemas.openxmlformats.org/officeDocument/2006/math" xmlns:a14="http://schemas.microsoft.com/office/drawing/2010/main" xmlns:ma14="http://schemas.microsoft.com/office/mac/drawingml/2011/main" val="1"/>
             </a:ext>
           </a:extLst>
         </p:spPr>
@@ -13960,7 +13956,7 @@
           </a:ln>
           <a:extLst>
             <a:ext uri="{C572A759-6A51-4108-AA02-DFA0A04FC94B}">
-              <ma14:wrappingTextBoxFlag xmlns:ma14="http://schemas.microsoft.com/office/mac/drawingml/2011/main" xmlns:a14="http://schemas.microsoft.com/office/drawing/2010/main" xmlns:m="http://schemas.openxmlformats.org/officeDocument/2006/math" xmlns="" val="1"/>
+              <ma14:wrappingTextBoxFlag xmlns="" xmlns:m="http://schemas.openxmlformats.org/officeDocument/2006/math" xmlns:a14="http://schemas.microsoft.com/office/drawing/2010/main" xmlns:ma14="http://schemas.microsoft.com/office/mac/drawingml/2011/main" val="1"/>
             </a:ext>
           </a:extLst>
         </p:spPr>
@@ -14384,7 +14380,7 @@
           </a:ln>
           <a:extLst>
             <a:ext uri="{C572A759-6A51-4108-AA02-DFA0A04FC94B}">
-              <ma14:wrappingTextBoxFlag xmlns:ma14="http://schemas.microsoft.com/office/mac/drawingml/2011/main" xmlns:a14="http://schemas.microsoft.com/office/drawing/2010/main" xmlns:m="http://schemas.openxmlformats.org/officeDocument/2006/math" xmlns="" val="1"/>
+              <ma14:wrappingTextBoxFlag xmlns="" xmlns:m="http://schemas.openxmlformats.org/officeDocument/2006/math" xmlns:a14="http://schemas.microsoft.com/office/drawing/2010/main" xmlns:ma14="http://schemas.microsoft.com/office/mac/drawingml/2011/main" val="1"/>
             </a:ext>
           </a:extLst>
         </p:spPr>
@@ -14490,7 +14486,7 @@
           </a:ln>
           <a:extLst>
             <a:ext uri="{C572A759-6A51-4108-AA02-DFA0A04FC94B}">
-              <ma14:wrappingTextBoxFlag xmlns:ma14="http://schemas.microsoft.com/office/mac/drawingml/2011/main" xmlns:a14="http://schemas.microsoft.com/office/drawing/2010/main" xmlns:m="http://schemas.openxmlformats.org/officeDocument/2006/math" xmlns="" val="1"/>
+              <ma14:wrappingTextBoxFlag xmlns="" xmlns:m="http://schemas.openxmlformats.org/officeDocument/2006/math" xmlns:a14="http://schemas.microsoft.com/office/drawing/2010/main" xmlns:ma14="http://schemas.microsoft.com/office/mac/drawingml/2011/main" val="1"/>
             </a:ext>
           </a:extLst>
         </p:spPr>
@@ -15015,7 +15011,7 @@
           </a:ln>
           <a:extLst>
             <a:ext uri="{C572A759-6A51-4108-AA02-DFA0A04FC94B}">
-              <ma14:wrappingTextBoxFlag xmlns:ma14="http://schemas.microsoft.com/office/mac/drawingml/2011/main" xmlns:a14="http://schemas.microsoft.com/office/drawing/2010/main" xmlns:m="http://schemas.openxmlformats.org/officeDocument/2006/math" xmlns="" val="1"/>
+              <ma14:wrappingTextBoxFlag xmlns="" xmlns:m="http://schemas.openxmlformats.org/officeDocument/2006/math" xmlns:a14="http://schemas.microsoft.com/office/drawing/2010/main" xmlns:ma14="http://schemas.microsoft.com/office/mac/drawingml/2011/main" val="1"/>
             </a:ext>
           </a:extLst>
         </p:spPr>
@@ -15062,7 +15058,7 @@
           </a:ln>
           <a:extLst>
             <a:ext uri="{C572A759-6A51-4108-AA02-DFA0A04FC94B}">
-              <ma14:wrappingTextBoxFlag xmlns:ma14="http://schemas.microsoft.com/office/mac/drawingml/2011/main" xmlns:a14="http://schemas.microsoft.com/office/drawing/2010/main" xmlns:m="http://schemas.openxmlformats.org/officeDocument/2006/math" xmlns="" val="1"/>
+              <ma14:wrappingTextBoxFlag xmlns="" xmlns:m="http://schemas.openxmlformats.org/officeDocument/2006/math" xmlns:a14="http://schemas.microsoft.com/office/drawing/2010/main" xmlns:ma14="http://schemas.microsoft.com/office/mac/drawingml/2011/main" val="1"/>
             </a:ext>
           </a:extLst>
         </p:spPr>
@@ -15168,7 +15164,7 @@
           </a:ln>
           <a:extLst>
             <a:ext uri="{C572A759-6A51-4108-AA02-DFA0A04FC94B}">
-              <ma14:wrappingTextBoxFlag xmlns:ma14="http://schemas.microsoft.com/office/mac/drawingml/2011/main" xmlns:a14="http://schemas.microsoft.com/office/drawing/2010/main" xmlns:m="http://schemas.openxmlformats.org/officeDocument/2006/math" xmlns="" val="1"/>
+              <ma14:wrappingTextBoxFlag xmlns="" xmlns:m="http://schemas.openxmlformats.org/officeDocument/2006/math" xmlns:a14="http://schemas.microsoft.com/office/drawing/2010/main" xmlns:ma14="http://schemas.microsoft.com/office/mac/drawingml/2011/main" val="1"/>
             </a:ext>
           </a:extLst>
         </p:spPr>
@@ -15465,7 +15461,7 @@
           </a:ln>
           <a:extLst>
             <a:ext uri="{C572A759-6A51-4108-AA02-DFA0A04FC94B}">
-              <ma14:wrappingTextBoxFlag xmlns:ma14="http://schemas.microsoft.com/office/mac/drawingml/2011/main" xmlns:a14="http://schemas.microsoft.com/office/drawing/2010/main" xmlns:m="http://schemas.openxmlformats.org/officeDocument/2006/math" xmlns="" val="1"/>
+              <ma14:wrappingTextBoxFlag xmlns="" xmlns:m="http://schemas.openxmlformats.org/officeDocument/2006/math" xmlns:a14="http://schemas.microsoft.com/office/drawing/2010/main" xmlns:ma14="http://schemas.microsoft.com/office/mac/drawingml/2011/main" val="1"/>
             </a:ext>
           </a:extLst>
         </p:spPr>
@@ -15900,7 +15896,7 @@
           </a:ln>
           <a:extLst>
             <a:ext uri="{C572A759-6A51-4108-AA02-DFA0A04FC94B}">
-              <ma14:wrappingTextBoxFlag xmlns:ma14="http://schemas.microsoft.com/office/mac/drawingml/2011/main" xmlns:a14="http://schemas.microsoft.com/office/drawing/2010/main" xmlns:m="http://schemas.openxmlformats.org/officeDocument/2006/math" xmlns="" val="1"/>
+              <ma14:wrappingTextBoxFlag xmlns="" xmlns:m="http://schemas.openxmlformats.org/officeDocument/2006/math" xmlns:a14="http://schemas.microsoft.com/office/drawing/2010/main" xmlns:ma14="http://schemas.microsoft.com/office/mac/drawingml/2011/main" val="1"/>
             </a:ext>
           </a:extLst>
         </p:spPr>
@@ -16347,7 +16343,7 @@
           </a:ln>
           <a:extLst>
             <a:ext uri="{C572A759-6A51-4108-AA02-DFA0A04FC94B}">
-              <ma14:wrappingTextBoxFlag xmlns:ma14="http://schemas.microsoft.com/office/mac/drawingml/2011/main" xmlns:a14="http://schemas.microsoft.com/office/drawing/2010/main" xmlns:m="http://schemas.openxmlformats.org/officeDocument/2006/math" xmlns="" val="1"/>
+              <ma14:wrappingTextBoxFlag xmlns="" xmlns:m="http://schemas.openxmlformats.org/officeDocument/2006/math" xmlns:a14="http://schemas.microsoft.com/office/drawing/2010/main" xmlns:ma14="http://schemas.microsoft.com/office/mac/drawingml/2011/main" val="1"/>
             </a:ext>
           </a:extLst>
         </p:spPr>
@@ -16721,7 +16717,7 @@
           </a:ln>
           <a:extLst>
             <a:ext uri="{C572A759-6A51-4108-AA02-DFA0A04FC94B}">
-              <ma14:wrappingTextBoxFlag xmlns:ma14="http://schemas.microsoft.com/office/mac/drawingml/2011/main" xmlns:a14="http://schemas.microsoft.com/office/drawing/2010/main" xmlns:m="http://schemas.openxmlformats.org/officeDocument/2006/math" xmlns="" val="1"/>
+              <ma14:wrappingTextBoxFlag xmlns="" xmlns:m="http://schemas.openxmlformats.org/officeDocument/2006/math" xmlns:a14="http://schemas.microsoft.com/office/drawing/2010/main" xmlns:ma14="http://schemas.microsoft.com/office/mac/drawingml/2011/main" val="1"/>
             </a:ext>
           </a:extLst>
         </p:spPr>
@@ -16936,7 +16932,7 @@
           </a:ln>
           <a:extLst>
             <a:ext uri="{C572A759-6A51-4108-AA02-DFA0A04FC94B}">
-              <ma14:wrappingTextBoxFlag xmlns:ma14="http://schemas.microsoft.com/office/mac/drawingml/2011/main" xmlns:a14="http://schemas.microsoft.com/office/drawing/2010/main" xmlns:m="http://schemas.openxmlformats.org/officeDocument/2006/math" xmlns="" val="1"/>
+              <ma14:wrappingTextBoxFlag xmlns="" xmlns:m="http://schemas.openxmlformats.org/officeDocument/2006/math" xmlns:a14="http://schemas.microsoft.com/office/drawing/2010/main" xmlns:ma14="http://schemas.microsoft.com/office/mac/drawingml/2011/main" val="1"/>
             </a:ext>
           </a:extLst>
         </p:spPr>
@@ -17299,7 +17295,7 @@
           </a:ln>
           <a:extLst>
             <a:ext uri="{C572A759-6A51-4108-AA02-DFA0A04FC94B}">
-              <ma14:wrappingTextBoxFlag xmlns:ma14="http://schemas.microsoft.com/office/mac/drawingml/2011/main" xmlns:a14="http://schemas.microsoft.com/office/drawing/2010/main" xmlns:m="http://schemas.openxmlformats.org/officeDocument/2006/math" xmlns="" val="1"/>
+              <ma14:wrappingTextBoxFlag xmlns="" xmlns:m="http://schemas.openxmlformats.org/officeDocument/2006/math" xmlns:a14="http://schemas.microsoft.com/office/drawing/2010/main" xmlns:ma14="http://schemas.microsoft.com/office/mac/drawingml/2011/main" val="1"/>
             </a:ext>
           </a:extLst>
         </p:spPr>
@@ -17603,7 +17599,7 @@
           </a:ln>
           <a:extLst>
             <a:ext uri="{C572A759-6A51-4108-AA02-DFA0A04FC94B}">
-              <ma14:wrappingTextBoxFlag xmlns:ma14="http://schemas.microsoft.com/office/mac/drawingml/2011/main" xmlns:a14="http://schemas.microsoft.com/office/drawing/2010/main" xmlns:m="http://schemas.openxmlformats.org/officeDocument/2006/math" xmlns="" val="1"/>
+              <ma14:wrappingTextBoxFlag xmlns="" xmlns:m="http://schemas.openxmlformats.org/officeDocument/2006/math" xmlns:a14="http://schemas.microsoft.com/office/drawing/2010/main" xmlns:ma14="http://schemas.microsoft.com/office/mac/drawingml/2011/main" val="1"/>
             </a:ext>
           </a:extLst>
         </p:spPr>
@@ -17731,7 +17727,7 @@
           </a:ln>
           <a:extLst>
             <a:ext uri="{C572A759-6A51-4108-AA02-DFA0A04FC94B}">
-              <ma14:wrappingTextBoxFlag xmlns:ma14="http://schemas.microsoft.com/office/mac/drawingml/2011/main" xmlns:a14="http://schemas.microsoft.com/office/drawing/2010/main" xmlns:m="http://schemas.openxmlformats.org/officeDocument/2006/math" xmlns="" val="1"/>
+              <ma14:wrappingTextBoxFlag xmlns="" xmlns:m="http://schemas.openxmlformats.org/officeDocument/2006/math" xmlns:a14="http://schemas.microsoft.com/office/drawing/2010/main" xmlns:ma14="http://schemas.microsoft.com/office/mac/drawingml/2011/main" val="1"/>
             </a:ext>
           </a:extLst>
         </p:spPr>
@@ -17862,7 +17858,7 @@
           </a:ln>
           <a:extLst>
             <a:ext uri="{C572A759-6A51-4108-AA02-DFA0A04FC94B}">
-              <ma14:wrappingTextBoxFlag xmlns:ma14="http://schemas.microsoft.com/office/mac/drawingml/2011/main" xmlns:a14="http://schemas.microsoft.com/office/drawing/2010/main" xmlns:m="http://schemas.openxmlformats.org/officeDocument/2006/math" xmlns="" val="1"/>
+              <ma14:wrappingTextBoxFlag xmlns="" xmlns:m="http://schemas.openxmlformats.org/officeDocument/2006/math" xmlns:a14="http://schemas.microsoft.com/office/drawing/2010/main" xmlns:ma14="http://schemas.microsoft.com/office/mac/drawingml/2011/main" val="1"/>
             </a:ext>
           </a:extLst>
         </p:spPr>
@@ -18259,7 +18255,7 @@
           </a:ln>
           <a:extLst>
             <a:ext uri="{C572A759-6A51-4108-AA02-DFA0A04FC94B}">
-              <ma14:wrappingTextBoxFlag xmlns:ma14="http://schemas.microsoft.com/office/mac/drawingml/2011/main" xmlns:a14="http://schemas.microsoft.com/office/drawing/2010/main" xmlns:m="http://schemas.openxmlformats.org/officeDocument/2006/math" xmlns="" val="1"/>
+              <ma14:wrappingTextBoxFlag xmlns="" xmlns:m="http://schemas.openxmlformats.org/officeDocument/2006/math" xmlns:a14="http://schemas.microsoft.com/office/drawing/2010/main" xmlns:ma14="http://schemas.microsoft.com/office/mac/drawingml/2011/main" val="1"/>
             </a:ext>
           </a:extLst>
         </p:spPr>
@@ -18303,7 +18299,7 @@
           </a:ln>
           <a:extLst>
             <a:ext uri="{C572A759-6A51-4108-AA02-DFA0A04FC94B}">
-              <ma14:wrappingTextBoxFlag xmlns:ma14="http://schemas.microsoft.com/office/mac/drawingml/2011/main" xmlns:a14="http://schemas.microsoft.com/office/drawing/2010/main" xmlns:m="http://schemas.openxmlformats.org/officeDocument/2006/math" xmlns="" val="1"/>
+              <ma14:wrappingTextBoxFlag xmlns="" xmlns:m="http://schemas.openxmlformats.org/officeDocument/2006/math" xmlns:a14="http://schemas.microsoft.com/office/drawing/2010/main" xmlns:ma14="http://schemas.microsoft.com/office/mac/drawingml/2011/main" val="1"/>
             </a:ext>
           </a:extLst>
         </p:spPr>
@@ -18347,7 +18343,7 @@
           </a:ln>
           <a:extLst>
             <a:ext uri="{C572A759-6A51-4108-AA02-DFA0A04FC94B}">
-              <ma14:wrappingTextBoxFlag xmlns:ma14="http://schemas.microsoft.com/office/mac/drawingml/2011/main" xmlns:a14="http://schemas.microsoft.com/office/drawing/2010/main" xmlns:m="http://schemas.openxmlformats.org/officeDocument/2006/math" xmlns="" val="1"/>
+              <ma14:wrappingTextBoxFlag xmlns="" xmlns:m="http://schemas.openxmlformats.org/officeDocument/2006/math" xmlns:a14="http://schemas.microsoft.com/office/drawing/2010/main" xmlns:ma14="http://schemas.microsoft.com/office/mac/drawingml/2011/main" val="1"/>
             </a:ext>
           </a:extLst>
         </p:spPr>
@@ -18391,7 +18387,7 @@
           </a:ln>
           <a:extLst>
             <a:ext uri="{C572A759-6A51-4108-AA02-DFA0A04FC94B}">
-              <ma14:wrappingTextBoxFlag xmlns:ma14="http://schemas.microsoft.com/office/mac/drawingml/2011/main" xmlns:a14="http://schemas.microsoft.com/office/drawing/2010/main" xmlns:m="http://schemas.openxmlformats.org/officeDocument/2006/math" xmlns="" val="1"/>
+              <ma14:wrappingTextBoxFlag xmlns="" xmlns:m="http://schemas.openxmlformats.org/officeDocument/2006/math" xmlns:a14="http://schemas.microsoft.com/office/drawing/2010/main" xmlns:ma14="http://schemas.microsoft.com/office/mac/drawingml/2011/main" val="1"/>
             </a:ext>
           </a:extLst>
         </p:spPr>
@@ -18430,7 +18426,7 @@
           </a:ln>
           <a:extLst>
             <a:ext uri="{C572A759-6A51-4108-AA02-DFA0A04FC94B}">
-              <ma14:wrappingTextBoxFlag xmlns:ma14="http://schemas.microsoft.com/office/mac/drawingml/2011/main" xmlns:a14="http://schemas.microsoft.com/office/drawing/2010/main" xmlns:m="http://schemas.openxmlformats.org/officeDocument/2006/math" xmlns="" val="1"/>
+              <ma14:wrappingTextBoxFlag xmlns="" xmlns:m="http://schemas.openxmlformats.org/officeDocument/2006/math" xmlns:a14="http://schemas.microsoft.com/office/drawing/2010/main" xmlns:ma14="http://schemas.microsoft.com/office/mac/drawingml/2011/main" val="1"/>
             </a:ext>
           </a:extLst>
         </p:spPr>
@@ -18492,7 +18488,7 @@
           </a:ln>
           <a:extLst>
             <a:ext uri="{C572A759-6A51-4108-AA02-DFA0A04FC94B}">
-              <ma14:wrappingTextBoxFlag xmlns:ma14="http://schemas.microsoft.com/office/mac/drawingml/2011/main" xmlns:a14="http://schemas.microsoft.com/office/drawing/2010/main" xmlns:m="http://schemas.openxmlformats.org/officeDocument/2006/math" xmlns="" val="1"/>
+              <ma14:wrappingTextBoxFlag xmlns="" xmlns:m="http://schemas.openxmlformats.org/officeDocument/2006/math" xmlns:a14="http://schemas.microsoft.com/office/drawing/2010/main" xmlns:ma14="http://schemas.microsoft.com/office/mac/drawingml/2011/main" val="1"/>
             </a:ext>
           </a:extLst>
         </p:spPr>
@@ -18527,7 +18523,7 @@
           </a:ln>
           <a:extLst>
             <a:ext uri="{C572A759-6A51-4108-AA02-DFA0A04FC94B}">
-              <ma14:wrappingTextBoxFlag xmlns:ma14="http://schemas.microsoft.com/office/mac/drawingml/2011/main" xmlns:a14="http://schemas.microsoft.com/office/drawing/2010/main" xmlns:m="http://schemas.openxmlformats.org/officeDocument/2006/math" xmlns="" val="1"/>
+              <ma14:wrappingTextBoxFlag xmlns="" xmlns:m="http://schemas.openxmlformats.org/officeDocument/2006/math" xmlns:a14="http://schemas.microsoft.com/office/drawing/2010/main" xmlns:ma14="http://schemas.microsoft.com/office/mac/drawingml/2011/main" val="1"/>
             </a:ext>
           </a:extLst>
         </p:spPr>
@@ -18562,7 +18558,7 @@
           </a:ln>
           <a:extLst>
             <a:ext uri="{C572A759-6A51-4108-AA02-DFA0A04FC94B}">
-              <ma14:wrappingTextBoxFlag xmlns:ma14="http://schemas.microsoft.com/office/mac/drawingml/2011/main" xmlns:a14="http://schemas.microsoft.com/office/drawing/2010/main" xmlns:m="http://schemas.openxmlformats.org/officeDocument/2006/math" xmlns="" val="1"/>
+              <ma14:wrappingTextBoxFlag xmlns="" xmlns:m="http://schemas.openxmlformats.org/officeDocument/2006/math" xmlns:a14="http://schemas.microsoft.com/office/drawing/2010/main" xmlns:ma14="http://schemas.microsoft.com/office/mac/drawingml/2011/main" val="1"/>
             </a:ext>
           </a:extLst>
         </p:spPr>
@@ -18797,7 +18793,7 @@
           </a:ln>
           <a:extLst>
             <a:ext uri="{C572A759-6A51-4108-AA02-DFA0A04FC94B}">
-              <ma14:wrappingTextBoxFlag xmlns:ma14="http://schemas.microsoft.com/office/mac/drawingml/2011/main" xmlns:a14="http://schemas.microsoft.com/office/drawing/2010/main" xmlns:m="http://schemas.openxmlformats.org/officeDocument/2006/math" xmlns="" val="1"/>
+              <ma14:wrappingTextBoxFlag xmlns="" xmlns:m="http://schemas.openxmlformats.org/officeDocument/2006/math" xmlns:a14="http://schemas.microsoft.com/office/drawing/2010/main" xmlns:ma14="http://schemas.microsoft.com/office/mac/drawingml/2011/main" val="1"/>
             </a:ext>
           </a:extLst>
         </p:spPr>
@@ -18836,7 +18832,7 @@
           </a:ln>
           <a:extLst>
             <a:ext uri="{C572A759-6A51-4108-AA02-DFA0A04FC94B}">
-              <ma14:wrappingTextBoxFlag xmlns:ma14="http://schemas.microsoft.com/office/mac/drawingml/2011/main" xmlns:a14="http://schemas.microsoft.com/office/drawing/2010/main" xmlns:m="http://schemas.openxmlformats.org/officeDocument/2006/math" xmlns="" val="1"/>
+              <ma14:wrappingTextBoxFlag xmlns="" xmlns:m="http://schemas.openxmlformats.org/officeDocument/2006/math" xmlns:a14="http://schemas.microsoft.com/office/drawing/2010/main" xmlns:ma14="http://schemas.microsoft.com/office/mac/drawingml/2011/main" val="1"/>
             </a:ext>
           </a:extLst>
         </p:spPr>
@@ -18875,7 +18871,7 @@
           </a:ln>
           <a:extLst>
             <a:ext uri="{C572A759-6A51-4108-AA02-DFA0A04FC94B}">
-              <ma14:wrappingTextBoxFlag xmlns:ma14="http://schemas.microsoft.com/office/mac/drawingml/2011/main" xmlns:a14="http://schemas.microsoft.com/office/drawing/2010/main" xmlns:m="http://schemas.openxmlformats.org/officeDocument/2006/math" xmlns="" val="1"/>
+              <ma14:wrappingTextBoxFlag xmlns="" xmlns:m="http://schemas.openxmlformats.org/officeDocument/2006/math" xmlns:a14="http://schemas.microsoft.com/office/drawing/2010/main" xmlns:ma14="http://schemas.microsoft.com/office/mac/drawingml/2011/main" val="1"/>
             </a:ext>
           </a:extLst>
         </p:spPr>
@@ -18914,7 +18910,7 @@
           </a:ln>
           <a:extLst>
             <a:ext uri="{C572A759-6A51-4108-AA02-DFA0A04FC94B}">
-              <ma14:wrappingTextBoxFlag xmlns:ma14="http://schemas.microsoft.com/office/mac/drawingml/2011/main" xmlns:a14="http://schemas.microsoft.com/office/drawing/2010/main" xmlns:m="http://schemas.openxmlformats.org/officeDocument/2006/math" xmlns="" val="1"/>
+              <ma14:wrappingTextBoxFlag xmlns="" xmlns:m="http://schemas.openxmlformats.org/officeDocument/2006/math" xmlns:a14="http://schemas.microsoft.com/office/drawing/2010/main" xmlns:ma14="http://schemas.microsoft.com/office/mac/drawingml/2011/main" val="1"/>
             </a:ext>
           </a:extLst>
         </p:spPr>
@@ -18960,7 +18956,7 @@
           </a:ln>
           <a:extLst>
             <a:ext uri="{C572A759-6A51-4108-AA02-DFA0A04FC94B}">
-              <ma14:wrappingTextBoxFlag xmlns:ma14="http://schemas.microsoft.com/office/mac/drawingml/2011/main" xmlns:a14="http://schemas.microsoft.com/office/drawing/2010/main" xmlns:m="http://schemas.openxmlformats.org/officeDocument/2006/math" xmlns="" val="1"/>
+              <ma14:wrappingTextBoxFlag xmlns="" xmlns:m="http://schemas.openxmlformats.org/officeDocument/2006/math" xmlns:a14="http://schemas.microsoft.com/office/drawing/2010/main" xmlns:ma14="http://schemas.microsoft.com/office/mac/drawingml/2011/main" val="1"/>
             </a:ext>
           </a:extLst>
         </p:spPr>
@@ -19016,7 +19012,7 @@
           </a:ln>
           <a:extLst>
             <a:ext uri="{C572A759-6A51-4108-AA02-DFA0A04FC94B}">
-              <ma14:wrappingTextBoxFlag xmlns:ma14="http://schemas.microsoft.com/office/mac/drawingml/2011/main" xmlns:a14="http://schemas.microsoft.com/office/drawing/2010/main" xmlns:m="http://schemas.openxmlformats.org/officeDocument/2006/math" xmlns="" val="1"/>
+              <ma14:wrappingTextBoxFlag xmlns="" xmlns:m="http://schemas.openxmlformats.org/officeDocument/2006/math" xmlns:a14="http://schemas.microsoft.com/office/drawing/2010/main" xmlns:ma14="http://schemas.microsoft.com/office/mac/drawingml/2011/main" val="1"/>
             </a:ext>
           </a:extLst>
         </p:spPr>

</xml_diff>